<commit_message>
Add metrics from GitHub
</commit_message>
<xml_diff>
--- a/Präsentation/RecipeManager_Präsentation.pptx
+++ b/Präsentation/RecipeManager_Präsentation.pptx
@@ -5,7 +5,7 @@
     <p:sldMasterId id="2147483960" r:id="rId4"/>
   </p:sldMasterIdLst>
   <p:notesMasterIdLst>
-    <p:notesMasterId r:id="rId27"/>
+    <p:notesMasterId r:id="rId29"/>
   </p:notesMasterIdLst>
   <p:sldIdLst>
     <p:sldId id="256" r:id="rId5"/>
@@ -25,11 +25,13 @@
     <p:sldId id="291" r:id="rId19"/>
     <p:sldId id="301" r:id="rId20"/>
     <p:sldId id="302" r:id="rId21"/>
-    <p:sldId id="293" r:id="rId22"/>
-    <p:sldId id="284" r:id="rId23"/>
-    <p:sldId id="292" r:id="rId24"/>
-    <p:sldId id="282" r:id="rId25"/>
-    <p:sldId id="283" r:id="rId26"/>
+    <p:sldId id="304" r:id="rId22"/>
+    <p:sldId id="303" r:id="rId23"/>
+    <p:sldId id="293" r:id="rId24"/>
+    <p:sldId id="284" r:id="rId25"/>
+    <p:sldId id="292" r:id="rId26"/>
+    <p:sldId id="282" r:id="rId27"/>
+    <p:sldId id="283" r:id="rId28"/>
   </p:sldIdLst>
   <p:sldSz cx="12192000" cy="6858000"/>
   <p:notesSz cx="6858000" cy="9144000"/>
@@ -1340,7 +1342,7 @@
     </p:spTree>
     <p:extLst>
       <p:ext uri="{BB962C8B-B14F-4D97-AF65-F5344CB8AC3E}">
-        <p14:creationId xmlns:p14="http://schemas.microsoft.com/office/powerpoint/2010/main" val="3094041841"/>
+        <p14:creationId xmlns:p14="http://schemas.microsoft.com/office/powerpoint/2010/main" val="949077923"/>
       </p:ext>
     </p:extLst>
   </p:cSld>
@@ -1424,7 +1426,7 @@
     </p:spTree>
     <p:extLst>
       <p:ext uri="{BB962C8B-B14F-4D97-AF65-F5344CB8AC3E}">
-        <p14:creationId xmlns:p14="http://schemas.microsoft.com/office/powerpoint/2010/main" val="3486985728"/>
+        <p14:creationId xmlns:p14="http://schemas.microsoft.com/office/powerpoint/2010/main" val="4144568296"/>
       </p:ext>
     </p:extLst>
   </p:cSld>
@@ -1596,7 +1598,7 @@
     </p:spTree>
     <p:extLst>
       <p:ext uri="{BB962C8B-B14F-4D97-AF65-F5344CB8AC3E}">
-        <p14:creationId xmlns:p14="http://schemas.microsoft.com/office/powerpoint/2010/main" val="3457144575"/>
+        <p14:creationId xmlns:p14="http://schemas.microsoft.com/office/powerpoint/2010/main" val="3094041841"/>
       </p:ext>
     </p:extLst>
   </p:cSld>
@@ -1680,7 +1682,7 @@
     </p:spTree>
     <p:extLst>
       <p:ext uri="{BB962C8B-B14F-4D97-AF65-F5344CB8AC3E}">
-        <p14:creationId xmlns:p14="http://schemas.microsoft.com/office/powerpoint/2010/main" val="3989377929"/>
+        <p14:creationId xmlns:p14="http://schemas.microsoft.com/office/powerpoint/2010/main" val="3486985728"/>
       </p:ext>
     </p:extLst>
   </p:cSld>
@@ -1756,6 +1758,174 @@
             <a:fld id="{35DABC87-BC72-469E-95B0-B653EAAE8441}" type="slidenum">
               <a:rPr lang="de-CH" smtClean="0"/>
               <a:t>22</a:t>
+            </a:fld>
+            <a:endParaRPr lang="de-CH"/>
+          </a:p>
+        </p:txBody>
+      </p:sp>
+    </p:spTree>
+    <p:extLst>
+      <p:ext uri="{BB962C8B-B14F-4D97-AF65-F5344CB8AC3E}">
+        <p14:creationId xmlns:p14="http://schemas.microsoft.com/office/powerpoint/2010/main" val="3457144575"/>
+      </p:ext>
+    </p:extLst>
+  </p:cSld>
+  <p:clrMapOvr>
+    <a:masterClrMapping/>
+  </p:clrMapOvr>
+</p:notes>
+</file>
+
+<file path=ppt/notesSlides/notesSlide23.xml><?xml version="1.0" encoding="utf-8"?>
+<p:notes xmlns:a="http://schemas.openxmlformats.org/drawingml/2006/main" xmlns:r="http://schemas.openxmlformats.org/officeDocument/2006/relationships" xmlns:p="http://schemas.openxmlformats.org/presentationml/2006/main">
+  <p:cSld>
+    <p:spTree>
+      <p:nvGrpSpPr>
+        <p:cNvPr id="1" name=""/>
+        <p:cNvGrpSpPr/>
+        <p:nvPr/>
+      </p:nvGrpSpPr>
+      <p:grpSpPr>
+        <a:xfrm>
+          <a:off x="0" y="0"/>
+          <a:ext cx="0" cy="0"/>
+          <a:chOff x="0" y="0"/>
+          <a:chExt cx="0" cy="0"/>
+        </a:xfrm>
+      </p:grpSpPr>
+      <p:sp>
+        <p:nvSpPr>
+          <p:cNvPr id="2" name="Folienbildplatzhalter 1"/>
+          <p:cNvSpPr>
+            <a:spLocks noGrp="1" noRot="1" noChangeAspect="1"/>
+          </p:cNvSpPr>
+          <p:nvPr>
+            <p:ph type="sldImg"/>
+          </p:nvPr>
+        </p:nvSpPr>
+        <p:spPr/>
+      </p:sp>
+      <p:sp>
+        <p:nvSpPr>
+          <p:cNvPr id="3" name="Notizenplatzhalter 2"/>
+          <p:cNvSpPr>
+            <a:spLocks noGrp="1"/>
+          </p:cNvSpPr>
+          <p:nvPr>
+            <p:ph type="body" idx="1"/>
+          </p:nvPr>
+        </p:nvSpPr>
+        <p:spPr/>
+        <p:txBody>
+          <a:bodyPr/>
+          <a:lstStyle/>
+          <a:p>
+            <a:endParaRPr lang="de-CH" dirty="0"/>
+          </a:p>
+        </p:txBody>
+      </p:sp>
+      <p:sp>
+        <p:nvSpPr>
+          <p:cNvPr id="4" name="Foliennummernplatzhalter 3"/>
+          <p:cNvSpPr>
+            <a:spLocks noGrp="1"/>
+          </p:cNvSpPr>
+          <p:nvPr>
+            <p:ph type="sldNum" sz="quarter" idx="5"/>
+          </p:nvPr>
+        </p:nvSpPr>
+        <p:spPr/>
+        <p:txBody>
+          <a:bodyPr/>
+          <a:lstStyle/>
+          <a:p>
+            <a:fld id="{35DABC87-BC72-469E-95B0-B653EAAE8441}" type="slidenum">
+              <a:rPr lang="de-CH" smtClean="0"/>
+              <a:t>23</a:t>
+            </a:fld>
+            <a:endParaRPr lang="de-CH"/>
+          </a:p>
+        </p:txBody>
+      </p:sp>
+    </p:spTree>
+    <p:extLst>
+      <p:ext uri="{BB962C8B-B14F-4D97-AF65-F5344CB8AC3E}">
+        <p14:creationId xmlns:p14="http://schemas.microsoft.com/office/powerpoint/2010/main" val="3989377929"/>
+      </p:ext>
+    </p:extLst>
+  </p:cSld>
+  <p:clrMapOvr>
+    <a:masterClrMapping/>
+  </p:clrMapOvr>
+</p:notes>
+</file>
+
+<file path=ppt/notesSlides/notesSlide24.xml><?xml version="1.0" encoding="utf-8"?>
+<p:notes xmlns:a="http://schemas.openxmlformats.org/drawingml/2006/main" xmlns:r="http://schemas.openxmlformats.org/officeDocument/2006/relationships" xmlns:p="http://schemas.openxmlformats.org/presentationml/2006/main">
+  <p:cSld>
+    <p:spTree>
+      <p:nvGrpSpPr>
+        <p:cNvPr id="1" name=""/>
+        <p:cNvGrpSpPr/>
+        <p:nvPr/>
+      </p:nvGrpSpPr>
+      <p:grpSpPr>
+        <a:xfrm>
+          <a:off x="0" y="0"/>
+          <a:ext cx="0" cy="0"/>
+          <a:chOff x="0" y="0"/>
+          <a:chExt cx="0" cy="0"/>
+        </a:xfrm>
+      </p:grpSpPr>
+      <p:sp>
+        <p:nvSpPr>
+          <p:cNvPr id="2" name="Folienbildplatzhalter 1"/>
+          <p:cNvSpPr>
+            <a:spLocks noGrp="1" noRot="1" noChangeAspect="1"/>
+          </p:cNvSpPr>
+          <p:nvPr>
+            <p:ph type="sldImg"/>
+          </p:nvPr>
+        </p:nvSpPr>
+        <p:spPr/>
+      </p:sp>
+      <p:sp>
+        <p:nvSpPr>
+          <p:cNvPr id="3" name="Notizenplatzhalter 2"/>
+          <p:cNvSpPr>
+            <a:spLocks noGrp="1"/>
+          </p:cNvSpPr>
+          <p:nvPr>
+            <p:ph type="body" idx="1"/>
+          </p:nvPr>
+        </p:nvSpPr>
+        <p:spPr/>
+        <p:txBody>
+          <a:bodyPr/>
+          <a:lstStyle/>
+          <a:p>
+            <a:endParaRPr lang="de-CH" dirty="0"/>
+          </a:p>
+        </p:txBody>
+      </p:sp>
+      <p:sp>
+        <p:nvSpPr>
+          <p:cNvPr id="4" name="Foliennummernplatzhalter 3"/>
+          <p:cNvSpPr>
+            <a:spLocks noGrp="1"/>
+          </p:cNvSpPr>
+          <p:nvPr>
+            <p:ph type="sldNum" sz="quarter" idx="5"/>
+          </p:nvPr>
+        </p:nvSpPr>
+        <p:spPr/>
+        <p:txBody>
+          <a:bodyPr/>
+          <a:lstStyle/>
+          <a:p>
+            <a:fld id="{35DABC87-BC72-469E-95B0-B653EAAE8441}" type="slidenum">
+              <a:rPr lang="de-CH" smtClean="0"/>
+              <a:t>24</a:t>
             </a:fld>
             <a:endParaRPr lang="de-CH"/>
           </a:p>
@@ -8391,11 +8561,11 @@
   <p:clrMapOvr>
     <a:masterClrMapping/>
   </p:clrMapOvr>
-  <mc:AlternateContent xmlns:mc="http://schemas.openxmlformats.org/markup-compatibility/2006">
-    <mc:Choice xmlns:p14="http://schemas.microsoft.com/office/powerpoint/2010/main" Requires="p14">
+  <mc:AlternateContent xmlns:mc="http://schemas.openxmlformats.org/markup-compatibility/2006" xmlns:p14="http://schemas.microsoft.com/office/powerpoint/2010/main">
+    <mc:Choice Requires="p14">
       <p:transition spd="slow" p14:dur="2000" advTm="33732"/>
     </mc:Choice>
-    <mc:Fallback>
+    <mc:Fallback xmlns="">
       <p:transition spd="slow" advTm="33732"/>
     </mc:Fallback>
   </mc:AlternateContent>
@@ -8522,11 +8692,11 @@
   <p:clrMapOvr>
     <a:masterClrMapping/>
   </p:clrMapOvr>
-  <mc:AlternateContent xmlns:mc="http://schemas.openxmlformats.org/markup-compatibility/2006">
-    <mc:Choice xmlns:p14="http://schemas.microsoft.com/office/powerpoint/2010/main" Requires="p14">
+  <mc:AlternateContent xmlns:mc="http://schemas.openxmlformats.org/markup-compatibility/2006" xmlns:p14="http://schemas.microsoft.com/office/powerpoint/2010/main">
+    <mc:Choice Requires="p14">
       <p:transition spd="slow" p14:dur="2000" advTm="33732"/>
     </mc:Choice>
-    <mc:Fallback>
+    <mc:Fallback xmlns="">
       <p:transition spd="slow" advTm="33732"/>
     </mc:Fallback>
   </mc:AlternateContent>
@@ -8674,6 +8844,222 @@
           </a:prstGeom>
         </p:spPr>
       </p:pic>
+      <p:pic>
+        <p:nvPicPr>
+          <p:cNvPr id="3" name="Grafik 2">
+            <a:extLst>
+              <a:ext uri="{FF2B5EF4-FFF2-40B4-BE49-F238E27FC236}">
+                <a16:creationId xmlns:a16="http://schemas.microsoft.com/office/drawing/2014/main" id="{9ED79D08-759A-1546-C757-2F9452AAFF93}"/>
+              </a:ext>
+            </a:extLst>
+          </p:cNvPr>
+          <p:cNvPicPr>
+            <a:picLocks noChangeAspect="1"/>
+          </p:cNvPicPr>
+          <p:nvPr/>
+        </p:nvPicPr>
+        <p:blipFill>
+          <a:blip r:embed="rId4">
+            <a:extLst>
+              <a:ext uri="{28A0092B-C50C-407E-A947-70E740481C1C}">
+                <a14:useLocalDpi xmlns:a14="http://schemas.microsoft.com/office/drawing/2010/main" val="0"/>
+              </a:ext>
+            </a:extLst>
+          </a:blip>
+          <a:stretch>
+            <a:fillRect/>
+          </a:stretch>
+        </p:blipFill>
+        <p:spPr>
+          <a:xfrm>
+            <a:off x="801095" y="739864"/>
+            <a:ext cx="753385" cy="412114"/>
+          </a:xfrm>
+          <a:prstGeom prst="rect">
+            <a:avLst/>
+          </a:prstGeom>
+        </p:spPr>
+      </p:pic>
+      <p:pic>
+        <p:nvPicPr>
+          <p:cNvPr id="4" name="Grafik 3">
+            <a:extLst>
+              <a:ext uri="{FF2B5EF4-FFF2-40B4-BE49-F238E27FC236}">
+                <a16:creationId xmlns:a16="http://schemas.microsoft.com/office/drawing/2014/main" id="{0FA82E3C-54B6-8869-5E9F-0304A2BBE6F4}"/>
+              </a:ext>
+            </a:extLst>
+          </p:cNvPr>
+          <p:cNvPicPr>
+            <a:picLocks noChangeAspect="1"/>
+          </p:cNvPicPr>
+          <p:nvPr/>
+        </p:nvPicPr>
+        <p:blipFill>
+          <a:blip r:embed="rId5">
+            <a:extLst>
+              <a:ext uri="{28A0092B-C50C-407E-A947-70E740481C1C}">
+                <a14:useLocalDpi xmlns:a14="http://schemas.microsoft.com/office/drawing/2010/main" val="0"/>
+              </a:ext>
+            </a:extLst>
+          </a:blip>
+          <a:stretch>
+            <a:fillRect/>
+          </a:stretch>
+        </p:blipFill>
+        <p:spPr>
+          <a:xfrm>
+            <a:off x="1396279" y="702441"/>
+            <a:ext cx="927541" cy="486959"/>
+          </a:xfrm>
+          <a:prstGeom prst="rect">
+            <a:avLst/>
+          </a:prstGeom>
+        </p:spPr>
+      </p:pic>
+      <p:pic>
+        <p:nvPicPr>
+          <p:cNvPr id="8" name="Grafik 7">
+            <a:extLst>
+              <a:ext uri="{FF2B5EF4-FFF2-40B4-BE49-F238E27FC236}">
+                <a16:creationId xmlns:a16="http://schemas.microsoft.com/office/drawing/2014/main" id="{20F7D292-E58B-4216-2CCB-FD4DE7A404B6}"/>
+              </a:ext>
+            </a:extLst>
+          </p:cNvPr>
+          <p:cNvPicPr>
+            <a:picLocks noChangeAspect="1"/>
+          </p:cNvPicPr>
+          <p:nvPr/>
+        </p:nvPicPr>
+        <p:blipFill>
+          <a:blip r:embed="rId5">
+            <a:extLst>
+              <a:ext uri="{28A0092B-C50C-407E-A947-70E740481C1C}">
+                <a14:useLocalDpi xmlns:a14="http://schemas.microsoft.com/office/drawing/2010/main" val="0"/>
+              </a:ext>
+            </a:extLst>
+          </a:blip>
+          <a:stretch>
+            <a:fillRect/>
+          </a:stretch>
+        </p:blipFill>
+        <p:spPr>
+          <a:xfrm>
+            <a:off x="626939" y="2469751"/>
+            <a:ext cx="927541" cy="486959"/>
+          </a:xfrm>
+          <a:prstGeom prst="rect">
+            <a:avLst/>
+          </a:prstGeom>
+        </p:spPr>
+      </p:pic>
+      <p:pic>
+        <p:nvPicPr>
+          <p:cNvPr id="9" name="Grafik 8">
+            <a:extLst>
+              <a:ext uri="{FF2B5EF4-FFF2-40B4-BE49-F238E27FC236}">
+                <a16:creationId xmlns:a16="http://schemas.microsoft.com/office/drawing/2014/main" id="{D3BC5D96-6D6B-3039-52B0-43E027AA61EB}"/>
+              </a:ext>
+            </a:extLst>
+          </p:cNvPr>
+          <p:cNvPicPr>
+            <a:picLocks noChangeAspect="1"/>
+          </p:cNvPicPr>
+          <p:nvPr/>
+        </p:nvPicPr>
+        <p:blipFill>
+          <a:blip r:embed="rId5">
+            <a:extLst>
+              <a:ext uri="{28A0092B-C50C-407E-A947-70E740481C1C}">
+                <a14:useLocalDpi xmlns:a14="http://schemas.microsoft.com/office/drawing/2010/main" val="0"/>
+              </a:ext>
+            </a:extLst>
+          </a:blip>
+          <a:stretch>
+            <a:fillRect/>
+          </a:stretch>
+        </p:blipFill>
+        <p:spPr>
+          <a:xfrm>
+            <a:off x="8049665" y="1335640"/>
+            <a:ext cx="844190" cy="443200"/>
+          </a:xfrm>
+          <a:prstGeom prst="rect">
+            <a:avLst/>
+          </a:prstGeom>
+        </p:spPr>
+      </p:pic>
+      <p:pic>
+        <p:nvPicPr>
+          <p:cNvPr id="10" name="Grafik 9">
+            <a:extLst>
+              <a:ext uri="{FF2B5EF4-FFF2-40B4-BE49-F238E27FC236}">
+                <a16:creationId xmlns:a16="http://schemas.microsoft.com/office/drawing/2014/main" id="{BE1891CB-D1AF-D132-AC86-B5498FCABC02}"/>
+              </a:ext>
+            </a:extLst>
+          </p:cNvPr>
+          <p:cNvPicPr>
+            <a:picLocks noChangeAspect="1"/>
+          </p:cNvPicPr>
+          <p:nvPr/>
+        </p:nvPicPr>
+        <p:blipFill>
+          <a:blip r:embed="rId6">
+            <a:extLst>
+              <a:ext uri="{28A0092B-C50C-407E-A947-70E740481C1C}">
+                <a14:useLocalDpi xmlns:a14="http://schemas.microsoft.com/office/drawing/2010/main" val="0"/>
+              </a:ext>
+            </a:extLst>
+          </a:blip>
+          <a:stretch>
+            <a:fillRect/>
+          </a:stretch>
+        </p:blipFill>
+        <p:spPr>
+          <a:xfrm>
+            <a:off x="5177737" y="6177370"/>
+            <a:ext cx="1207823" cy="342531"/>
+          </a:xfrm>
+          <a:prstGeom prst="rect">
+            <a:avLst/>
+          </a:prstGeom>
+        </p:spPr>
+      </p:pic>
+      <p:pic>
+        <p:nvPicPr>
+          <p:cNvPr id="11" name="Grafik 10">
+            <a:extLst>
+              <a:ext uri="{FF2B5EF4-FFF2-40B4-BE49-F238E27FC236}">
+                <a16:creationId xmlns:a16="http://schemas.microsoft.com/office/drawing/2014/main" id="{6734EBD4-7E4C-D81E-EAD6-D48F527DB754}"/>
+              </a:ext>
+            </a:extLst>
+          </p:cNvPr>
+          <p:cNvPicPr>
+            <a:picLocks noChangeAspect="1"/>
+          </p:cNvPicPr>
+          <p:nvPr/>
+        </p:nvPicPr>
+        <p:blipFill>
+          <a:blip r:embed="rId7">
+            <a:extLst>
+              <a:ext uri="{28A0092B-C50C-407E-A947-70E740481C1C}">
+                <a14:useLocalDpi xmlns:a14="http://schemas.microsoft.com/office/drawing/2010/main" val="0"/>
+              </a:ext>
+            </a:extLst>
+          </a:blip>
+          <a:stretch>
+            <a:fillRect/>
+          </a:stretch>
+        </p:blipFill>
+        <p:spPr>
+          <a:xfrm>
+            <a:off x="6684019" y="220041"/>
+            <a:ext cx="1167217" cy="389559"/>
+          </a:xfrm>
+          <a:prstGeom prst="rect">
+            <a:avLst/>
+          </a:prstGeom>
+        </p:spPr>
+      </p:pic>
     </p:spTree>
     <p:extLst>
       <p:ext uri="{BB962C8B-B14F-4D97-AF65-F5344CB8AC3E}">
@@ -8727,6 +9113,141 @@
                                         </p:cTn>
                                         <p:tgtEl>
                                           <p:spTgt spid="7"/>
+                                        </p:tgtEl>
+                                        <p:attrNameLst>
+                                          <p:attrName>style.visibility</p:attrName>
+                                        </p:attrNameLst>
+                                      </p:cBhvr>
+                                      <p:to>
+                                        <p:strVal val="visible"/>
+                                      </p:to>
+                                    </p:set>
+                                  </p:childTnLst>
+                                </p:cTn>
+                              </p:par>
+                              <p:par>
+                                <p:cTn id="7" presetID="1" presetClass="entr" presetSubtype="0" fill="hold" nodeType="withEffect">
+                                  <p:stCondLst>
+                                    <p:cond delay="0"/>
+                                  </p:stCondLst>
+                                  <p:childTnLst>
+                                    <p:set>
+                                      <p:cBhvr>
+                                        <p:cTn id="8" dur="1" fill="hold">
+                                          <p:stCondLst>
+                                            <p:cond delay="0"/>
+                                          </p:stCondLst>
+                                        </p:cTn>
+                                        <p:tgtEl>
+                                          <p:spTgt spid="3"/>
+                                        </p:tgtEl>
+                                        <p:attrNameLst>
+                                          <p:attrName>style.visibility</p:attrName>
+                                        </p:attrNameLst>
+                                      </p:cBhvr>
+                                      <p:to>
+                                        <p:strVal val="visible"/>
+                                      </p:to>
+                                    </p:set>
+                                  </p:childTnLst>
+                                </p:cTn>
+                              </p:par>
+                              <p:par>
+                                <p:cTn id="9" presetID="1" presetClass="entr" presetSubtype="0" fill="hold" nodeType="withEffect">
+                                  <p:stCondLst>
+                                    <p:cond delay="0"/>
+                                  </p:stCondLst>
+                                  <p:childTnLst>
+                                    <p:set>
+                                      <p:cBhvr>
+                                        <p:cTn id="10" dur="1" fill="hold">
+                                          <p:stCondLst>
+                                            <p:cond delay="0"/>
+                                          </p:stCondLst>
+                                        </p:cTn>
+                                        <p:tgtEl>
+                                          <p:spTgt spid="4"/>
+                                        </p:tgtEl>
+                                        <p:attrNameLst>
+                                          <p:attrName>style.visibility</p:attrName>
+                                        </p:attrNameLst>
+                                      </p:cBhvr>
+                                      <p:to>
+                                        <p:strVal val="visible"/>
+                                      </p:to>
+                                    </p:set>
+                                  </p:childTnLst>
+                                </p:cTn>
+                              </p:par>
+                              <p:par>
+                                <p:cTn id="11" presetID="1" presetClass="entr" presetSubtype="0" fill="hold" nodeType="withEffect">
+                                  <p:stCondLst>
+                                    <p:cond delay="0"/>
+                                  </p:stCondLst>
+                                  <p:childTnLst>
+                                    <p:set>
+                                      <p:cBhvr>
+                                        <p:cTn id="12" dur="1" fill="hold">
+                                          <p:stCondLst>
+                                            <p:cond delay="0"/>
+                                          </p:stCondLst>
+                                        </p:cTn>
+                                        <p:tgtEl>
+                                          <p:spTgt spid="8"/>
+                                        </p:tgtEl>
+                                        <p:attrNameLst>
+                                          <p:attrName>style.visibility</p:attrName>
+                                        </p:attrNameLst>
+                                      </p:cBhvr>
+                                      <p:to>
+                                        <p:strVal val="visible"/>
+                                      </p:to>
+                                    </p:set>
+                                  </p:childTnLst>
+                                </p:cTn>
+                              </p:par>
+                              <p:par>
+                                <p:cTn id="13" presetID="1" presetClass="entr" presetSubtype="0" fill="hold" nodeType="withEffect">
+                                  <p:stCondLst>
+                                    <p:cond delay="0"/>
+                                  </p:stCondLst>
+                                  <p:childTnLst>
+                                    <p:set>
+                                      <p:cBhvr>
+                                        <p:cTn id="14" dur="1" fill="hold">
+                                          <p:stCondLst>
+                                            <p:cond delay="0"/>
+                                          </p:stCondLst>
+                                        </p:cTn>
+                                        <p:tgtEl>
+                                          <p:spTgt spid="10"/>
+                                        </p:tgtEl>
+                                        <p:attrNameLst>
+                                          <p:attrName>style.visibility</p:attrName>
+                                        </p:attrNameLst>
+                                      </p:cBhvr>
+                                      <p:to>
+                                        <p:strVal val="visible"/>
+                                      </p:to>
+                                    </p:set>
+                                  </p:childTnLst>
+                                </p:cTn>
+                              </p:par>
+                              <p:par>
+                                <p:cTn id="15" presetID="1" presetClass="entr" presetSubtype="0" fill="hold" nodeType="withEffect">
+                                  <p:stCondLst>
+                                    <p:cond delay="0"/>
+                                  </p:stCondLst>
+                                  <p:childTnLst>
+                                    <p:set>
+                                      <p:cBhvr>
+                                        <p:cTn id="16" dur="1" fill="hold">
+                                          <p:stCondLst>
+                                            <p:cond delay="0"/>
+                                          </p:stCondLst>
+                                        </p:cTn>
+                                        <p:tgtEl>
+                                          <p:spTgt spid="11"/>
                                         </p:tgtEl>
                                         <p:attrNameLst>
                                           <p:attrName>style.visibility</p:attrName>
@@ -8891,11 +9412,11 @@
   <p:clrMapOvr>
     <a:masterClrMapping/>
   </p:clrMapOvr>
-  <mc:AlternateContent xmlns:mc="http://schemas.openxmlformats.org/markup-compatibility/2006">
-    <mc:Choice xmlns:p14="http://schemas.microsoft.com/office/powerpoint/2010/main" Requires="p14">
+  <mc:AlternateContent xmlns:mc="http://schemas.openxmlformats.org/markup-compatibility/2006" xmlns:p14="http://schemas.microsoft.com/office/powerpoint/2010/main">
+    <mc:Choice Requires="p14">
       <p:transition spd="slow" p14:dur="2000" advTm="33732"/>
     </mc:Choice>
-    <mc:Fallback>
+    <mc:Fallback xmlns="">
       <p:transition spd="slow" advTm="33732"/>
     </mc:Fallback>
   </mc:AlternateContent>
@@ -9027,11 +9548,11 @@
   <p:clrMapOvr>
     <a:masterClrMapping/>
   </p:clrMapOvr>
-  <mc:AlternateContent xmlns:mc="http://schemas.openxmlformats.org/markup-compatibility/2006">
-    <mc:Choice xmlns:p14="http://schemas.microsoft.com/office/powerpoint/2010/main" Requires="p14">
+  <mc:AlternateContent xmlns:mc="http://schemas.openxmlformats.org/markup-compatibility/2006" xmlns:p14="http://schemas.microsoft.com/office/powerpoint/2010/main">
+    <mc:Choice Requires="p14">
       <p:transition spd="slow" p14:dur="2000" advTm="33732"/>
     </mc:Choice>
-    <mc:Fallback>
+    <mc:Fallback xmlns="">
       <p:transition spd="slow" advTm="33732"/>
     </mc:Fallback>
   </mc:AlternateContent>
@@ -9448,11 +9969,11 @@
   <p:clrMapOvr>
     <a:masterClrMapping/>
   </p:clrMapOvr>
-  <mc:AlternateContent xmlns:mc="http://schemas.openxmlformats.org/markup-compatibility/2006">
-    <mc:Choice xmlns:p14="http://schemas.microsoft.com/office/powerpoint/2010/main" Requires="p14">
+  <mc:AlternateContent xmlns:mc="http://schemas.openxmlformats.org/markup-compatibility/2006" xmlns:p14="http://schemas.microsoft.com/office/powerpoint/2010/main">
+    <mc:Choice Requires="p14">
       <p:transition spd="slow" p14:dur="2000" advTm="33732"/>
     </mc:Choice>
-    <mc:Fallback>
+    <mc:Fallback xmlns="">
       <p:transition spd="slow" advTm="33732"/>
     </mc:Fallback>
   </mc:AlternateContent>
@@ -9815,6 +10336,13 @@
               <a:rPr lang="de-CH" dirty="0"/>
               <a:t>Metriken</a:t>
             </a:r>
+            <a:br>
+              <a:rPr lang="de-CH" dirty="0"/>
+            </a:br>
+            <a:r>
+              <a:rPr lang="de-CH" sz="2400" dirty="0"/>
+              <a:t>Code</a:t>
+            </a:r>
           </a:p>
         </p:txBody>
       </p:sp>
@@ -9834,7 +10362,12 @@
             <p:ph type="sldNum" sz="quarter" idx="12"/>
           </p:nvPr>
         </p:nvSpPr>
-        <p:spPr/>
+        <p:spPr>
+          <a:xfrm>
+            <a:off x="8384923" y="5935363"/>
+            <a:ext cx="683339" cy="365125"/>
+          </a:xfrm>
+        </p:spPr>
         <p:txBody>
           <a:bodyPr/>
           <a:lstStyle/>
@@ -9865,13 +10398,13 @@
         </p:nvSpPr>
         <p:spPr>
           <a:xfrm>
-            <a:off x="677334" y="2160589"/>
-            <a:ext cx="8596668" cy="4437236"/>
+            <a:off x="677334" y="1684020"/>
+            <a:ext cx="8596668" cy="4769025"/>
           </a:xfrm>
         </p:spPr>
         <p:txBody>
           <a:bodyPr>
-            <a:normAutofit fontScale="77500" lnSpcReduction="20000"/>
+            <a:normAutofit/>
           </a:bodyPr>
           <a:lstStyle/>
           <a:p>
@@ -9882,105 +10415,8 @@
             </a:pPr>
             <a:r>
               <a:rPr lang="de-CH" dirty="0"/>
-              <a:t>Anzahl Pull </a:t>
-            </a:r>
-            <a:r>
-              <a:rPr lang="de-CH" dirty="0" err="1"/>
-              <a:t>Requests</a:t>
-            </a:r>
-            <a:r>
-              <a:rPr lang="de-CH" dirty="0"/>
-              <a:t> 	</a:t>
-            </a:r>
-          </a:p>
-          <a:p>
-            <a:pPr>
-              <a:tabLst>
-                <a:tab pos="3586163" algn="l"/>
-              </a:tabLst>
-            </a:pPr>
-            <a:r>
-              <a:rPr lang="de-CH" dirty="0"/>
-              <a:t>Anzahl </a:t>
-            </a:r>
-            <a:r>
-              <a:rPr lang="de-CH" dirty="0" err="1"/>
-              <a:t>Commits</a:t>
-            </a:r>
-            <a:r>
-              <a:rPr lang="de-CH" dirty="0"/>
-              <a:t>	</a:t>
-            </a:r>
-          </a:p>
-          <a:p>
-            <a:pPr>
-              <a:tabLst>
-                <a:tab pos="3586163" algn="l"/>
-              </a:tabLst>
-            </a:pPr>
-            <a:r>
-              <a:rPr lang="de-CH" dirty="0"/>
-              <a:t>Anzahl </a:t>
-            </a:r>
-            <a:r>
-              <a:rPr lang="de-CH" dirty="0" err="1"/>
-              <a:t>Builds</a:t>
-            </a:r>
-            <a:endParaRPr lang="de-CH" dirty="0"/>
-          </a:p>
-          <a:p>
-            <a:pPr>
-              <a:tabLst>
-                <a:tab pos="3586163" algn="l"/>
-              </a:tabLst>
-            </a:pPr>
-            <a:r>
-              <a:rPr lang="de-CH" dirty="0"/>
-              <a:t>Aufteilung Sprachen</a:t>
-            </a:r>
-          </a:p>
-          <a:p>
-            <a:pPr>
-              <a:tabLst>
-                <a:tab pos="3586163" algn="l"/>
-              </a:tabLst>
-            </a:pPr>
-            <a:r>
-              <a:rPr lang="de-CH" dirty="0"/>
-              <a:t>Anzahl Code-Zeilen</a:t>
-            </a:r>
-          </a:p>
-          <a:p>
-            <a:pPr>
-              <a:tabLst>
-                <a:tab pos="3586163" algn="l"/>
-              </a:tabLst>
-            </a:pPr>
-            <a:r>
-              <a:rPr lang="de-CH" dirty="0"/>
-              <a:t>Test Coverage</a:t>
-            </a:r>
-          </a:p>
-          <a:p>
-            <a:pPr marL="0" indent="0">
-              <a:buNone/>
-              <a:tabLst>
-                <a:tab pos="3586163" algn="l"/>
-              </a:tabLst>
-            </a:pPr>
-            <a:endParaRPr lang="de-CH" dirty="0"/>
-          </a:p>
-          <a:p>
-            <a:pPr>
-              <a:tabLst>
-                <a:tab pos="3586163" algn="l"/>
-              </a:tabLst>
-            </a:pPr>
-            <a:r>
-              <a:rPr lang="de-CH" dirty="0" err="1"/>
-              <a:t>Contribution</a:t>
-            </a:r>
-            <a:endParaRPr lang="de-CH" dirty="0"/>
+              <a:t>Frontend</a:t>
+            </a:r>
           </a:p>
           <a:p>
             <a:pPr>
@@ -9996,73 +10432,1205 @@
                 <a:tab pos="3586163" algn="l"/>
               </a:tabLst>
             </a:pPr>
-            <a:r>
-              <a:rPr lang="de-CH" dirty="0"/>
-              <a:t>Allgemein:</a:t>
-            </a:r>
-          </a:p>
-          <a:p>
-            <a:pPr lvl="1">
+            <a:endParaRPr lang="de-CH" dirty="0"/>
+          </a:p>
+          <a:p>
+            <a:pPr>
               <a:tabLst>
                 <a:tab pos="3586163" algn="l"/>
               </a:tabLst>
             </a:pPr>
-            <a:r>
-              <a:rPr lang="de-CH" dirty="0"/>
-              <a:t>Anzahl Tickets</a:t>
-            </a:r>
-          </a:p>
-          <a:p>
-            <a:pPr lvl="1">
+            <a:endParaRPr lang="de-CH" dirty="0"/>
+          </a:p>
+          <a:p>
+            <a:pPr>
               <a:tabLst>
                 <a:tab pos="3586163" algn="l"/>
               </a:tabLst>
             </a:pPr>
-            <a:r>
-              <a:rPr lang="de-CH" dirty="0"/>
-              <a:t>Anzahl Sprints</a:t>
-            </a:r>
-          </a:p>
-          <a:p>
-            <a:pPr lvl="1">
+            <a:endParaRPr lang="de-CH" dirty="0"/>
+          </a:p>
+          <a:p>
+            <a:pPr>
               <a:tabLst>
                 <a:tab pos="3586163" algn="l"/>
               </a:tabLst>
             </a:pPr>
             <a:r>
               <a:rPr lang="de-CH" dirty="0"/>
-              <a:t>Flussdiagramm (Anzahl Tickets)</a:t>
-            </a:r>
-          </a:p>
-          <a:p>
-            <a:pPr lvl="1">
+              <a:t>Backend</a:t>
+            </a:r>
+          </a:p>
+          <a:p>
+            <a:pPr>
               <a:tabLst>
                 <a:tab pos="3586163" algn="l"/>
               </a:tabLst>
             </a:pPr>
-            <a:r>
-              <a:rPr lang="de-CH" dirty="0">
-                <a:sym typeface="Wingdings" panose="05000000000000000000" pitchFamily="2" charset="2"/>
-              </a:rPr>
-              <a:t> Zeitauswertung</a:t>
-            </a:r>
-          </a:p>
-          <a:p>
-            <a:pPr lvl="1">
+            <a:endParaRPr lang="de-CH" dirty="0"/>
+          </a:p>
+          <a:p>
+            <a:pPr>
               <a:tabLst>
                 <a:tab pos="3586163" algn="l"/>
               </a:tabLst>
             </a:pPr>
-            <a:r>
-              <a:rPr lang="de-CH" dirty="0">
-                <a:sym typeface="Wingdings" panose="05000000000000000000" pitchFamily="2" charset="2"/>
-              </a:rPr>
-              <a:t>Aufteilung Zeit, Verhältnis zu Allgemein / Implementation</a:t>
-            </a:r>
             <a:endParaRPr lang="de-CH" dirty="0"/>
           </a:p>
-        </p:txBody>
-      </p:sp>
+          <a:p>
+            <a:pPr>
+              <a:tabLst>
+                <a:tab pos="3586163" algn="l"/>
+              </a:tabLst>
+            </a:pPr>
+            <a:endParaRPr lang="de-CH" dirty="0"/>
+          </a:p>
+          <a:p>
+            <a:pPr>
+              <a:tabLst>
+                <a:tab pos="3586163" algn="l"/>
+              </a:tabLst>
+            </a:pPr>
+            <a:endParaRPr lang="de-CH" dirty="0"/>
+          </a:p>
+          <a:p>
+            <a:pPr>
+              <a:tabLst>
+                <a:tab pos="3586163" algn="l"/>
+              </a:tabLst>
+            </a:pPr>
+            <a:r>
+              <a:rPr lang="de-CH" dirty="0"/>
+              <a:t>Authentication</a:t>
+            </a:r>
+          </a:p>
+        </p:txBody>
+      </p:sp>
+      <p:pic>
+        <p:nvPicPr>
+          <p:cNvPr id="6" name="Grafik 5">
+            <a:extLst>
+              <a:ext uri="{FF2B5EF4-FFF2-40B4-BE49-F238E27FC236}">
+                <a16:creationId xmlns:a16="http://schemas.microsoft.com/office/drawing/2014/main" id="{371BE42B-ED22-1446-D74F-49939CDD625F}"/>
+              </a:ext>
+            </a:extLst>
+          </p:cNvPr>
+          <p:cNvPicPr>
+            <a:picLocks noChangeAspect="1"/>
+          </p:cNvPicPr>
+          <p:nvPr/>
+        </p:nvPicPr>
+        <p:blipFill>
+          <a:blip r:embed="rId3"/>
+          <a:stretch>
+            <a:fillRect/>
+          </a:stretch>
+        </p:blipFill>
+        <p:spPr>
+          <a:xfrm>
+            <a:off x="3838215" y="1058167"/>
+            <a:ext cx="6198363" cy="1678102"/>
+          </a:xfrm>
+          <a:prstGeom prst="rect">
+            <a:avLst/>
+          </a:prstGeom>
+          <a:effectLst>
+            <a:softEdge rad="63500"/>
+          </a:effectLst>
+        </p:spPr>
+      </p:pic>
+      <p:pic>
+        <p:nvPicPr>
+          <p:cNvPr id="8" name="Grafik 7">
+            <a:extLst>
+              <a:ext uri="{FF2B5EF4-FFF2-40B4-BE49-F238E27FC236}">
+                <a16:creationId xmlns:a16="http://schemas.microsoft.com/office/drawing/2014/main" id="{85D42CB3-65EE-D1D8-84D8-D5428F8C56B5}"/>
+              </a:ext>
+            </a:extLst>
+          </p:cNvPr>
+          <p:cNvPicPr>
+            <a:picLocks noChangeAspect="1"/>
+          </p:cNvPicPr>
+          <p:nvPr/>
+        </p:nvPicPr>
+        <p:blipFill>
+          <a:blip r:embed="rId4"/>
+          <a:stretch>
+            <a:fillRect/>
+          </a:stretch>
+        </p:blipFill>
+        <p:spPr>
+          <a:xfrm>
+            <a:off x="3838215" y="3134382"/>
+            <a:ext cx="6198363" cy="1686539"/>
+          </a:xfrm>
+          <a:prstGeom prst="rect">
+            <a:avLst/>
+          </a:prstGeom>
+          <a:effectLst>
+            <a:softEdge rad="63500"/>
+          </a:effectLst>
+        </p:spPr>
+      </p:pic>
+      <p:pic>
+        <p:nvPicPr>
+          <p:cNvPr id="10" name="Grafik 9">
+            <a:extLst>
+              <a:ext uri="{FF2B5EF4-FFF2-40B4-BE49-F238E27FC236}">
+                <a16:creationId xmlns:a16="http://schemas.microsoft.com/office/drawing/2014/main" id="{DF99AFFB-1B6F-69F1-3D9A-35BDD317A5F1}"/>
+              </a:ext>
+            </a:extLst>
+          </p:cNvPr>
+          <p:cNvPicPr>
+            <a:picLocks noChangeAspect="1"/>
+          </p:cNvPicPr>
+          <p:nvPr/>
+        </p:nvPicPr>
+        <p:blipFill>
+          <a:blip r:embed="rId5"/>
+          <a:stretch>
+            <a:fillRect/>
+          </a:stretch>
+        </p:blipFill>
+        <p:spPr>
+          <a:xfrm>
+            <a:off x="5573649" y="5088465"/>
+            <a:ext cx="4476231" cy="1681417"/>
+          </a:xfrm>
+          <a:prstGeom prst="rect">
+            <a:avLst/>
+          </a:prstGeom>
+          <a:effectLst>
+            <a:softEdge rad="63500"/>
+          </a:effectLst>
+        </p:spPr>
+      </p:pic>
+      <p:graphicFrame>
+        <p:nvGraphicFramePr>
+          <p:cNvPr id="13" name="Tabelle 13">
+            <a:extLst>
+              <a:ext uri="{FF2B5EF4-FFF2-40B4-BE49-F238E27FC236}">
+                <a16:creationId xmlns:a16="http://schemas.microsoft.com/office/drawing/2014/main" id="{E1CA8A20-AADB-FFBF-360A-150F790878FB}"/>
+              </a:ext>
+            </a:extLst>
+          </p:cNvPr>
+          <p:cNvGraphicFramePr>
+            <a:graphicFrameLocks noGrp="1"/>
+          </p:cNvGraphicFramePr>
+          <p:nvPr>
+            <p:extLst>
+              <p:ext uri="{D42A27DB-BD31-4B8C-83A1-F6EECF244321}">
+                <p14:modId xmlns:p14="http://schemas.microsoft.com/office/powerpoint/2010/main" val="3126204081"/>
+              </p:ext>
+            </p:extLst>
+          </p:nvPr>
+        </p:nvGraphicFramePr>
+        <p:xfrm>
+          <a:off x="3288727" y="1166034"/>
+          <a:ext cx="612713" cy="1437315"/>
+        </p:xfrm>
+        <a:graphic>
+          <a:graphicData uri="http://schemas.openxmlformats.org/drawingml/2006/table">
+            <a:tbl>
+              <a:tblPr bandRow="1">
+                <a:tableStyleId>{5C22544A-7EE6-4342-B048-85BDC9FD1C3A}</a:tableStyleId>
+              </a:tblPr>
+              <a:tblGrid>
+                <a:gridCol w="612713">
+                  <a:extLst>
+                    <a:ext uri="{9D8B030D-6E8A-4147-A177-3AD203B41FA5}">
+                      <a16:colId xmlns:a16="http://schemas.microsoft.com/office/drawing/2014/main" val="2554245310"/>
+                    </a:ext>
+                  </a:extLst>
+                </a:gridCol>
+              </a:tblGrid>
+              <a:tr h="479105">
+                <a:tc>
+                  <a:txBody>
+                    <a:bodyPr/>
+                    <a:lstStyle/>
+                    <a:p>
+                      <a:r>
+                        <a:rPr lang="de-CH" dirty="0">
+                          <a:solidFill>
+                            <a:schemeClr val="tx1">
+                              <a:lumMod val="75000"/>
+                              <a:lumOff val="25000"/>
+                            </a:schemeClr>
+                          </a:solidFill>
+                        </a:rPr>
+                        <a:t>20</a:t>
+                      </a:r>
+                    </a:p>
+                  </a:txBody>
+                  <a:tcPr anchor="ctr">
+                    <a:lnL w="12700" cmpd="sng">
+                      <a:noFill/>
+                    </a:lnL>
+                    <a:lnR w="12700" cmpd="sng">
+                      <a:noFill/>
+                    </a:lnR>
+                    <a:lnT w="12700" cmpd="sng">
+                      <a:noFill/>
+                    </a:lnT>
+                    <a:lnB w="12700" cmpd="sng">
+                      <a:noFill/>
+                    </a:lnB>
+                    <a:lnTlToBr w="12700" cmpd="sng">
+                      <a:noFill/>
+                      <a:prstDash val="solid"/>
+                    </a:lnTlToBr>
+                    <a:lnBlToTr w="12700" cmpd="sng">
+                      <a:noFill/>
+                      <a:prstDash val="solid"/>
+                    </a:lnBlToTr>
+                    <a:noFill/>
+                  </a:tcPr>
+                </a:tc>
+                <a:extLst>
+                  <a:ext uri="{0D108BD9-81ED-4DB2-BD59-A6C34878D82A}">
+                    <a16:rowId xmlns:a16="http://schemas.microsoft.com/office/drawing/2014/main" val="612619829"/>
+                  </a:ext>
+                </a:extLst>
+              </a:tr>
+              <a:tr h="479105">
+                <a:tc>
+                  <a:txBody>
+                    <a:bodyPr/>
+                    <a:lstStyle/>
+                    <a:p>
+                      <a:r>
+                        <a:rPr lang="de-CH" sz="1800" kern="1200" dirty="0">
+                          <a:solidFill>
+                            <a:schemeClr val="tx1">
+                              <a:lumMod val="75000"/>
+                              <a:lumOff val="25000"/>
+                            </a:schemeClr>
+                          </a:solidFill>
+                          <a:latin typeface="+mn-lt"/>
+                          <a:ea typeface="+mn-ea"/>
+                          <a:cs typeface="+mn-cs"/>
+                        </a:rPr>
+                        <a:t>343</a:t>
+                      </a:r>
+                    </a:p>
+                  </a:txBody>
+                  <a:tcPr anchor="ctr">
+                    <a:lnL w="12700" cmpd="sng">
+                      <a:noFill/>
+                    </a:lnL>
+                    <a:lnR w="12700" cmpd="sng">
+                      <a:noFill/>
+                    </a:lnR>
+                    <a:lnT w="12700" cmpd="sng">
+                      <a:noFill/>
+                    </a:lnT>
+                    <a:lnB w="12700" cmpd="sng">
+                      <a:noFill/>
+                    </a:lnB>
+                    <a:lnTlToBr w="12700" cmpd="sng">
+                      <a:noFill/>
+                      <a:prstDash val="solid"/>
+                    </a:lnTlToBr>
+                    <a:lnBlToTr w="12700" cmpd="sng">
+                      <a:noFill/>
+                      <a:prstDash val="solid"/>
+                    </a:lnBlToTr>
+                    <a:noFill/>
+                  </a:tcPr>
+                </a:tc>
+                <a:extLst>
+                  <a:ext uri="{0D108BD9-81ED-4DB2-BD59-A6C34878D82A}">
+                    <a16:rowId xmlns:a16="http://schemas.microsoft.com/office/drawing/2014/main" val="343101764"/>
+                  </a:ext>
+                </a:extLst>
+              </a:tr>
+              <a:tr h="479105">
+                <a:tc>
+                  <a:txBody>
+                    <a:bodyPr/>
+                    <a:lstStyle/>
+                    <a:p>
+                      <a:r>
+                        <a:rPr lang="de-CH" sz="1800" kern="1200" dirty="0">
+                          <a:solidFill>
+                            <a:schemeClr val="tx1">
+                              <a:lumMod val="75000"/>
+                              <a:lumOff val="25000"/>
+                            </a:schemeClr>
+                          </a:solidFill>
+                          <a:latin typeface="+mn-lt"/>
+                          <a:ea typeface="+mn-ea"/>
+                          <a:cs typeface="+mn-cs"/>
+                        </a:rPr>
+                        <a:t>210</a:t>
+                      </a:r>
+                    </a:p>
+                  </a:txBody>
+                  <a:tcPr anchor="ctr">
+                    <a:lnL w="12700" cmpd="sng">
+                      <a:noFill/>
+                    </a:lnL>
+                    <a:lnR w="12700" cmpd="sng">
+                      <a:noFill/>
+                    </a:lnR>
+                    <a:lnT w="12700" cmpd="sng">
+                      <a:noFill/>
+                    </a:lnT>
+                    <a:lnB w="12700" cmpd="sng">
+                      <a:noFill/>
+                    </a:lnB>
+                    <a:lnTlToBr w="12700" cmpd="sng">
+                      <a:noFill/>
+                      <a:prstDash val="solid"/>
+                    </a:lnTlToBr>
+                    <a:lnBlToTr w="12700" cmpd="sng">
+                      <a:noFill/>
+                      <a:prstDash val="solid"/>
+                    </a:lnBlToTr>
+                    <a:noFill/>
+                  </a:tcPr>
+                </a:tc>
+                <a:extLst>
+                  <a:ext uri="{0D108BD9-81ED-4DB2-BD59-A6C34878D82A}">
+                    <a16:rowId xmlns:a16="http://schemas.microsoft.com/office/drawing/2014/main" val="2473331925"/>
+                  </a:ext>
+                </a:extLst>
+              </a:tr>
+            </a:tbl>
+          </a:graphicData>
+        </a:graphic>
+      </p:graphicFrame>
+      <p:grpSp>
+        <p:nvGrpSpPr>
+          <p:cNvPr id="19" name="Gruppieren 18">
+            <a:extLst>
+              <a:ext uri="{FF2B5EF4-FFF2-40B4-BE49-F238E27FC236}">
+                <a16:creationId xmlns:a16="http://schemas.microsoft.com/office/drawing/2014/main" id="{420ADE48-D91E-D18C-1E5A-C82BE076E723}"/>
+              </a:ext>
+            </a:extLst>
+          </p:cNvPr>
+          <p:cNvGrpSpPr/>
+          <p:nvPr/>
+        </p:nvGrpSpPr>
+        <p:grpSpPr>
+          <a:xfrm>
+            <a:off x="2936184" y="1235177"/>
+            <a:ext cx="352544" cy="1307733"/>
+            <a:chOff x="3258870" y="2118360"/>
+            <a:chExt cx="352544" cy="1307733"/>
+          </a:xfrm>
+        </p:grpSpPr>
+        <p:pic>
+          <p:nvPicPr>
+            <p:cNvPr id="12" name="Grafik 11">
+              <a:extLst>
+                <a:ext uri="{FF2B5EF4-FFF2-40B4-BE49-F238E27FC236}">
+                  <a16:creationId xmlns:a16="http://schemas.microsoft.com/office/drawing/2014/main" id="{717E4A54-9EC8-4487-8BC8-BD6057F75B5C}"/>
+                </a:ext>
+              </a:extLst>
+            </p:cNvPr>
+            <p:cNvPicPr>
+              <a:picLocks noChangeAspect="1"/>
+            </p:cNvPicPr>
+            <p:nvPr/>
+          </p:nvPicPr>
+          <p:blipFill>
+            <a:blip r:embed="rId6"/>
+            <a:stretch>
+              <a:fillRect/>
+            </a:stretch>
+          </p:blipFill>
+          <p:spPr>
+            <a:xfrm>
+              <a:off x="3272172" y="2118360"/>
+              <a:ext cx="339242" cy="354598"/>
+            </a:xfrm>
+            <a:prstGeom prst="rect">
+              <a:avLst/>
+            </a:prstGeom>
+          </p:spPr>
+        </p:pic>
+        <p:pic>
+          <p:nvPicPr>
+            <p:cNvPr id="15" name="Grafik 14">
+              <a:extLst>
+                <a:ext uri="{FF2B5EF4-FFF2-40B4-BE49-F238E27FC236}">
+                  <a16:creationId xmlns:a16="http://schemas.microsoft.com/office/drawing/2014/main" id="{6DD5B344-5AE9-8FCA-34BB-B2C6C7AC84A8}"/>
+                </a:ext>
+              </a:extLst>
+            </p:cNvPr>
+            <p:cNvPicPr>
+              <a:picLocks noChangeAspect="1"/>
+            </p:cNvPicPr>
+            <p:nvPr/>
+          </p:nvPicPr>
+          <p:blipFill>
+            <a:blip r:embed="rId7"/>
+            <a:stretch>
+              <a:fillRect/>
+            </a:stretch>
+          </p:blipFill>
+          <p:spPr>
+            <a:xfrm>
+              <a:off x="3258871" y="2599488"/>
+              <a:ext cx="352543" cy="336774"/>
+            </a:xfrm>
+            <a:prstGeom prst="rect">
+              <a:avLst/>
+            </a:prstGeom>
+          </p:spPr>
+        </p:pic>
+        <p:pic>
+          <p:nvPicPr>
+            <p:cNvPr id="17" name="Grafik 16">
+              <a:extLst>
+                <a:ext uri="{FF2B5EF4-FFF2-40B4-BE49-F238E27FC236}">
+                  <a16:creationId xmlns:a16="http://schemas.microsoft.com/office/drawing/2014/main" id="{D820A708-DD51-2360-AE43-782D26A0E53F}"/>
+                </a:ext>
+              </a:extLst>
+            </p:cNvPr>
+            <p:cNvPicPr>
+              <a:picLocks noChangeAspect="1"/>
+            </p:cNvPicPr>
+            <p:nvPr/>
+          </p:nvPicPr>
+          <p:blipFill>
+            <a:blip r:embed="rId8"/>
+            <a:stretch>
+              <a:fillRect/>
+            </a:stretch>
+          </p:blipFill>
+          <p:spPr>
+            <a:xfrm>
+              <a:off x="3258870" y="3078481"/>
+              <a:ext cx="352543" cy="347612"/>
+            </a:xfrm>
+            <a:prstGeom prst="rect">
+              <a:avLst/>
+            </a:prstGeom>
+          </p:spPr>
+        </p:pic>
+      </p:grpSp>
+      <p:graphicFrame>
+        <p:nvGraphicFramePr>
+          <p:cNvPr id="20" name="Tabelle 13">
+            <a:extLst>
+              <a:ext uri="{FF2B5EF4-FFF2-40B4-BE49-F238E27FC236}">
+                <a16:creationId xmlns:a16="http://schemas.microsoft.com/office/drawing/2014/main" id="{F9E2E61D-DB4A-BE3D-FF1C-3D711D287799}"/>
+              </a:ext>
+            </a:extLst>
+          </p:cNvPr>
+          <p:cNvGraphicFramePr>
+            <a:graphicFrameLocks noGrp="1"/>
+          </p:cNvGraphicFramePr>
+          <p:nvPr>
+            <p:extLst>
+              <p:ext uri="{D42A27DB-BD31-4B8C-83A1-F6EECF244321}">
+                <p14:modId xmlns:p14="http://schemas.microsoft.com/office/powerpoint/2010/main" val="1884300838"/>
+              </p:ext>
+            </p:extLst>
+          </p:nvPr>
+        </p:nvGraphicFramePr>
+        <p:xfrm>
+          <a:off x="3288727" y="3242249"/>
+          <a:ext cx="612713" cy="1437315"/>
+        </p:xfrm>
+        <a:graphic>
+          <a:graphicData uri="http://schemas.openxmlformats.org/drawingml/2006/table">
+            <a:tbl>
+              <a:tblPr bandRow="1">
+                <a:tableStyleId>{5C22544A-7EE6-4342-B048-85BDC9FD1C3A}</a:tableStyleId>
+              </a:tblPr>
+              <a:tblGrid>
+                <a:gridCol w="612713">
+                  <a:extLst>
+                    <a:ext uri="{9D8B030D-6E8A-4147-A177-3AD203B41FA5}">
+                      <a16:colId xmlns:a16="http://schemas.microsoft.com/office/drawing/2014/main" val="2554245310"/>
+                    </a:ext>
+                  </a:extLst>
+                </a:gridCol>
+              </a:tblGrid>
+              <a:tr h="479105">
+                <a:tc>
+                  <a:txBody>
+                    <a:bodyPr/>
+                    <a:lstStyle/>
+                    <a:p>
+                      <a:r>
+                        <a:rPr lang="de-CH" sz="1800" kern="1200" dirty="0">
+                          <a:solidFill>
+                            <a:schemeClr val="tx1">
+                              <a:lumMod val="75000"/>
+                              <a:lumOff val="25000"/>
+                            </a:schemeClr>
+                          </a:solidFill>
+                          <a:latin typeface="+mn-lt"/>
+                          <a:ea typeface="+mn-ea"/>
+                          <a:cs typeface="+mn-cs"/>
+                        </a:rPr>
+                        <a:t>12</a:t>
+                      </a:r>
+                    </a:p>
+                  </a:txBody>
+                  <a:tcPr anchor="ctr">
+                    <a:lnL w="12700" cmpd="sng">
+                      <a:noFill/>
+                    </a:lnL>
+                    <a:lnR w="12700" cmpd="sng">
+                      <a:noFill/>
+                    </a:lnR>
+                    <a:lnT w="12700" cmpd="sng">
+                      <a:noFill/>
+                    </a:lnT>
+                    <a:lnB w="12700" cmpd="sng">
+                      <a:noFill/>
+                    </a:lnB>
+                    <a:lnTlToBr w="12700" cmpd="sng">
+                      <a:noFill/>
+                      <a:prstDash val="solid"/>
+                    </a:lnTlToBr>
+                    <a:lnBlToTr w="12700" cmpd="sng">
+                      <a:noFill/>
+                      <a:prstDash val="solid"/>
+                    </a:lnBlToTr>
+                    <a:noFill/>
+                  </a:tcPr>
+                </a:tc>
+                <a:extLst>
+                  <a:ext uri="{0D108BD9-81ED-4DB2-BD59-A6C34878D82A}">
+                    <a16:rowId xmlns:a16="http://schemas.microsoft.com/office/drawing/2014/main" val="612619829"/>
+                  </a:ext>
+                </a:extLst>
+              </a:tr>
+              <a:tr h="479105">
+                <a:tc>
+                  <a:txBody>
+                    <a:bodyPr/>
+                    <a:lstStyle/>
+                    <a:p>
+                      <a:r>
+                        <a:rPr lang="de-CH" sz="1800" kern="1200" dirty="0">
+                          <a:solidFill>
+                            <a:schemeClr val="tx1">
+                              <a:lumMod val="75000"/>
+                              <a:lumOff val="25000"/>
+                            </a:schemeClr>
+                          </a:solidFill>
+                          <a:latin typeface="+mn-lt"/>
+                          <a:ea typeface="+mn-ea"/>
+                          <a:cs typeface="+mn-cs"/>
+                        </a:rPr>
+                        <a:t>224</a:t>
+                      </a:r>
+                    </a:p>
+                  </a:txBody>
+                  <a:tcPr anchor="ctr">
+                    <a:lnL w="12700" cmpd="sng">
+                      <a:noFill/>
+                    </a:lnL>
+                    <a:lnR w="12700" cmpd="sng">
+                      <a:noFill/>
+                    </a:lnR>
+                    <a:lnT w="12700" cmpd="sng">
+                      <a:noFill/>
+                    </a:lnT>
+                    <a:lnB w="12700" cmpd="sng">
+                      <a:noFill/>
+                    </a:lnB>
+                    <a:lnTlToBr w="12700" cmpd="sng">
+                      <a:noFill/>
+                      <a:prstDash val="solid"/>
+                    </a:lnTlToBr>
+                    <a:lnBlToTr w="12700" cmpd="sng">
+                      <a:noFill/>
+                      <a:prstDash val="solid"/>
+                    </a:lnBlToTr>
+                    <a:noFill/>
+                  </a:tcPr>
+                </a:tc>
+                <a:extLst>
+                  <a:ext uri="{0D108BD9-81ED-4DB2-BD59-A6C34878D82A}">
+                    <a16:rowId xmlns:a16="http://schemas.microsoft.com/office/drawing/2014/main" val="343101764"/>
+                  </a:ext>
+                </a:extLst>
+              </a:tr>
+              <a:tr h="479105">
+                <a:tc>
+                  <a:txBody>
+                    <a:bodyPr/>
+                    <a:lstStyle/>
+                    <a:p>
+                      <a:r>
+                        <a:rPr lang="de-CH" sz="1800" kern="1200" dirty="0">
+                          <a:solidFill>
+                            <a:schemeClr val="tx1">
+                              <a:lumMod val="75000"/>
+                              <a:lumOff val="25000"/>
+                            </a:schemeClr>
+                          </a:solidFill>
+                          <a:latin typeface="+mn-lt"/>
+                          <a:ea typeface="+mn-ea"/>
+                          <a:cs typeface="+mn-cs"/>
+                        </a:rPr>
+                        <a:t>91</a:t>
+                      </a:r>
+                    </a:p>
+                  </a:txBody>
+                  <a:tcPr anchor="ctr">
+                    <a:lnL w="12700" cmpd="sng">
+                      <a:noFill/>
+                    </a:lnL>
+                    <a:lnR w="12700" cmpd="sng">
+                      <a:noFill/>
+                    </a:lnR>
+                    <a:lnT w="12700" cmpd="sng">
+                      <a:noFill/>
+                    </a:lnT>
+                    <a:lnB w="12700" cmpd="sng">
+                      <a:noFill/>
+                    </a:lnB>
+                    <a:lnTlToBr w="12700" cmpd="sng">
+                      <a:noFill/>
+                      <a:prstDash val="solid"/>
+                    </a:lnTlToBr>
+                    <a:lnBlToTr w="12700" cmpd="sng">
+                      <a:noFill/>
+                      <a:prstDash val="solid"/>
+                    </a:lnBlToTr>
+                    <a:noFill/>
+                  </a:tcPr>
+                </a:tc>
+                <a:extLst>
+                  <a:ext uri="{0D108BD9-81ED-4DB2-BD59-A6C34878D82A}">
+                    <a16:rowId xmlns:a16="http://schemas.microsoft.com/office/drawing/2014/main" val="2473331925"/>
+                  </a:ext>
+                </a:extLst>
+              </a:tr>
+            </a:tbl>
+          </a:graphicData>
+        </a:graphic>
+      </p:graphicFrame>
+      <p:grpSp>
+        <p:nvGrpSpPr>
+          <p:cNvPr id="21" name="Gruppieren 20">
+            <a:extLst>
+              <a:ext uri="{FF2B5EF4-FFF2-40B4-BE49-F238E27FC236}">
+                <a16:creationId xmlns:a16="http://schemas.microsoft.com/office/drawing/2014/main" id="{C29FE290-230B-DA82-34D0-2A3BFAE16A66}"/>
+              </a:ext>
+            </a:extLst>
+          </p:cNvPr>
+          <p:cNvGrpSpPr/>
+          <p:nvPr/>
+        </p:nvGrpSpPr>
+        <p:grpSpPr>
+          <a:xfrm>
+            <a:off x="2936184" y="3311392"/>
+            <a:ext cx="352544" cy="1307733"/>
+            <a:chOff x="3258870" y="2118360"/>
+            <a:chExt cx="352544" cy="1307733"/>
+          </a:xfrm>
+        </p:grpSpPr>
+        <p:pic>
+          <p:nvPicPr>
+            <p:cNvPr id="22" name="Grafik 21">
+              <a:extLst>
+                <a:ext uri="{FF2B5EF4-FFF2-40B4-BE49-F238E27FC236}">
+                  <a16:creationId xmlns:a16="http://schemas.microsoft.com/office/drawing/2014/main" id="{05F41433-1605-9AC6-A5D2-45A35C111B24}"/>
+                </a:ext>
+              </a:extLst>
+            </p:cNvPr>
+            <p:cNvPicPr>
+              <a:picLocks noChangeAspect="1"/>
+            </p:cNvPicPr>
+            <p:nvPr/>
+          </p:nvPicPr>
+          <p:blipFill>
+            <a:blip r:embed="rId6"/>
+            <a:stretch>
+              <a:fillRect/>
+            </a:stretch>
+          </p:blipFill>
+          <p:spPr>
+            <a:xfrm>
+              <a:off x="3272172" y="2118360"/>
+              <a:ext cx="339242" cy="354598"/>
+            </a:xfrm>
+            <a:prstGeom prst="rect">
+              <a:avLst/>
+            </a:prstGeom>
+          </p:spPr>
+        </p:pic>
+        <p:pic>
+          <p:nvPicPr>
+            <p:cNvPr id="23" name="Grafik 22">
+              <a:extLst>
+                <a:ext uri="{FF2B5EF4-FFF2-40B4-BE49-F238E27FC236}">
+                  <a16:creationId xmlns:a16="http://schemas.microsoft.com/office/drawing/2014/main" id="{0AC6523A-8CF3-5F39-FFA5-94C2FEB011E6}"/>
+                </a:ext>
+              </a:extLst>
+            </p:cNvPr>
+            <p:cNvPicPr>
+              <a:picLocks noChangeAspect="1"/>
+            </p:cNvPicPr>
+            <p:nvPr/>
+          </p:nvPicPr>
+          <p:blipFill>
+            <a:blip r:embed="rId7"/>
+            <a:stretch>
+              <a:fillRect/>
+            </a:stretch>
+          </p:blipFill>
+          <p:spPr>
+            <a:xfrm>
+              <a:off x="3258871" y="2599488"/>
+              <a:ext cx="352543" cy="336774"/>
+            </a:xfrm>
+            <a:prstGeom prst="rect">
+              <a:avLst/>
+            </a:prstGeom>
+          </p:spPr>
+        </p:pic>
+        <p:pic>
+          <p:nvPicPr>
+            <p:cNvPr id="24" name="Grafik 23">
+              <a:extLst>
+                <a:ext uri="{FF2B5EF4-FFF2-40B4-BE49-F238E27FC236}">
+                  <a16:creationId xmlns:a16="http://schemas.microsoft.com/office/drawing/2014/main" id="{3E0D52A7-20FC-1F29-2D81-F60AB8B5F2A9}"/>
+                </a:ext>
+              </a:extLst>
+            </p:cNvPr>
+            <p:cNvPicPr>
+              <a:picLocks noChangeAspect="1"/>
+            </p:cNvPicPr>
+            <p:nvPr/>
+          </p:nvPicPr>
+          <p:blipFill>
+            <a:blip r:embed="rId8"/>
+            <a:stretch>
+              <a:fillRect/>
+            </a:stretch>
+          </p:blipFill>
+          <p:spPr>
+            <a:xfrm>
+              <a:off x="3258870" y="3078481"/>
+              <a:ext cx="352543" cy="347612"/>
+            </a:xfrm>
+            <a:prstGeom prst="rect">
+              <a:avLst/>
+            </a:prstGeom>
+          </p:spPr>
+        </p:pic>
+      </p:grpSp>
+      <p:graphicFrame>
+        <p:nvGraphicFramePr>
+          <p:cNvPr id="25" name="Tabelle 13">
+            <a:extLst>
+              <a:ext uri="{FF2B5EF4-FFF2-40B4-BE49-F238E27FC236}">
+                <a16:creationId xmlns:a16="http://schemas.microsoft.com/office/drawing/2014/main" id="{73329195-6203-AD51-52CC-8D91A25EFFC8}"/>
+              </a:ext>
+            </a:extLst>
+          </p:cNvPr>
+          <p:cNvGraphicFramePr>
+            <a:graphicFrameLocks noGrp="1"/>
+          </p:cNvGraphicFramePr>
+          <p:nvPr>
+            <p:extLst>
+              <p:ext uri="{D42A27DB-BD31-4B8C-83A1-F6EECF244321}">
+                <p14:modId xmlns:p14="http://schemas.microsoft.com/office/powerpoint/2010/main" val="2545681001"/>
+              </p:ext>
+            </p:extLst>
+          </p:nvPr>
+        </p:nvGraphicFramePr>
+        <p:xfrm>
+          <a:off x="3302029" y="5174478"/>
+          <a:ext cx="612713" cy="1437315"/>
+        </p:xfrm>
+        <a:graphic>
+          <a:graphicData uri="http://schemas.openxmlformats.org/drawingml/2006/table">
+            <a:tbl>
+              <a:tblPr bandRow="1">
+                <a:tableStyleId>{5C22544A-7EE6-4342-B048-85BDC9FD1C3A}</a:tableStyleId>
+              </a:tblPr>
+              <a:tblGrid>
+                <a:gridCol w="612713">
+                  <a:extLst>
+                    <a:ext uri="{9D8B030D-6E8A-4147-A177-3AD203B41FA5}">
+                      <a16:colId xmlns:a16="http://schemas.microsoft.com/office/drawing/2014/main" val="2554245310"/>
+                    </a:ext>
+                  </a:extLst>
+                </a:gridCol>
+              </a:tblGrid>
+              <a:tr h="479105">
+                <a:tc>
+                  <a:txBody>
+                    <a:bodyPr/>
+                    <a:lstStyle/>
+                    <a:p>
+                      <a:r>
+                        <a:rPr lang="de-CH" sz="1800" kern="1200" dirty="0">
+                          <a:solidFill>
+                            <a:schemeClr val="tx1">
+                              <a:lumMod val="75000"/>
+                              <a:lumOff val="25000"/>
+                            </a:schemeClr>
+                          </a:solidFill>
+                          <a:latin typeface="+mn-lt"/>
+                          <a:ea typeface="+mn-ea"/>
+                          <a:cs typeface="+mn-cs"/>
+                        </a:rPr>
+                        <a:t>1</a:t>
+                      </a:r>
+                    </a:p>
+                  </a:txBody>
+                  <a:tcPr anchor="ctr">
+                    <a:lnL w="12700" cmpd="sng">
+                      <a:noFill/>
+                    </a:lnL>
+                    <a:lnR w="12700" cmpd="sng">
+                      <a:noFill/>
+                    </a:lnR>
+                    <a:lnT w="12700" cmpd="sng">
+                      <a:noFill/>
+                    </a:lnT>
+                    <a:lnB w="12700" cmpd="sng">
+                      <a:noFill/>
+                    </a:lnB>
+                    <a:lnTlToBr w="12700" cmpd="sng">
+                      <a:noFill/>
+                      <a:prstDash val="solid"/>
+                    </a:lnTlToBr>
+                    <a:lnBlToTr w="12700" cmpd="sng">
+                      <a:noFill/>
+                      <a:prstDash val="solid"/>
+                    </a:lnBlToTr>
+                    <a:noFill/>
+                  </a:tcPr>
+                </a:tc>
+                <a:extLst>
+                  <a:ext uri="{0D108BD9-81ED-4DB2-BD59-A6C34878D82A}">
+                    <a16:rowId xmlns:a16="http://schemas.microsoft.com/office/drawing/2014/main" val="612619829"/>
+                  </a:ext>
+                </a:extLst>
+              </a:tr>
+              <a:tr h="479105">
+                <a:tc>
+                  <a:txBody>
+                    <a:bodyPr/>
+                    <a:lstStyle/>
+                    <a:p>
+                      <a:r>
+                        <a:rPr lang="de-CH" sz="1800" kern="1200" dirty="0">
+                          <a:solidFill>
+                            <a:schemeClr val="tx1">
+                              <a:lumMod val="75000"/>
+                              <a:lumOff val="25000"/>
+                            </a:schemeClr>
+                          </a:solidFill>
+                          <a:latin typeface="+mn-lt"/>
+                          <a:ea typeface="+mn-ea"/>
+                          <a:cs typeface="+mn-cs"/>
+                        </a:rPr>
+                        <a:t>55</a:t>
+                      </a:r>
+                    </a:p>
+                  </a:txBody>
+                  <a:tcPr anchor="ctr">
+                    <a:lnL w="12700" cmpd="sng">
+                      <a:noFill/>
+                    </a:lnL>
+                    <a:lnR w="12700" cmpd="sng">
+                      <a:noFill/>
+                    </a:lnR>
+                    <a:lnT w="12700" cmpd="sng">
+                      <a:noFill/>
+                    </a:lnT>
+                    <a:lnB w="12700" cmpd="sng">
+                      <a:noFill/>
+                    </a:lnB>
+                    <a:lnTlToBr w="12700" cmpd="sng">
+                      <a:noFill/>
+                      <a:prstDash val="solid"/>
+                    </a:lnTlToBr>
+                    <a:lnBlToTr w="12700" cmpd="sng">
+                      <a:noFill/>
+                      <a:prstDash val="solid"/>
+                    </a:lnBlToTr>
+                    <a:noFill/>
+                  </a:tcPr>
+                </a:tc>
+                <a:extLst>
+                  <a:ext uri="{0D108BD9-81ED-4DB2-BD59-A6C34878D82A}">
+                    <a16:rowId xmlns:a16="http://schemas.microsoft.com/office/drawing/2014/main" val="343101764"/>
+                  </a:ext>
+                </a:extLst>
+              </a:tr>
+              <a:tr h="479105">
+                <a:tc>
+                  <a:txBody>
+                    <a:bodyPr/>
+                    <a:lstStyle/>
+                    <a:p>
+                      <a:r>
+                        <a:rPr lang="de-CH" sz="1800" kern="1200" dirty="0">
+                          <a:solidFill>
+                            <a:schemeClr val="tx1">
+                              <a:lumMod val="75000"/>
+                              <a:lumOff val="25000"/>
+                            </a:schemeClr>
+                          </a:solidFill>
+                          <a:latin typeface="+mn-lt"/>
+                          <a:ea typeface="+mn-ea"/>
+                          <a:cs typeface="+mn-cs"/>
+                        </a:rPr>
+                        <a:t>11</a:t>
+                      </a:r>
+                    </a:p>
+                  </a:txBody>
+                  <a:tcPr anchor="ctr">
+                    <a:lnL w="12700" cmpd="sng">
+                      <a:noFill/>
+                    </a:lnL>
+                    <a:lnR w="12700" cmpd="sng">
+                      <a:noFill/>
+                    </a:lnR>
+                    <a:lnT w="12700" cmpd="sng">
+                      <a:noFill/>
+                    </a:lnT>
+                    <a:lnB w="12700" cmpd="sng">
+                      <a:noFill/>
+                    </a:lnB>
+                    <a:lnTlToBr w="12700" cmpd="sng">
+                      <a:noFill/>
+                      <a:prstDash val="solid"/>
+                    </a:lnTlToBr>
+                    <a:lnBlToTr w="12700" cmpd="sng">
+                      <a:noFill/>
+                      <a:prstDash val="solid"/>
+                    </a:lnBlToTr>
+                    <a:noFill/>
+                  </a:tcPr>
+                </a:tc>
+                <a:extLst>
+                  <a:ext uri="{0D108BD9-81ED-4DB2-BD59-A6C34878D82A}">
+                    <a16:rowId xmlns:a16="http://schemas.microsoft.com/office/drawing/2014/main" val="2473331925"/>
+                  </a:ext>
+                </a:extLst>
+              </a:tr>
+            </a:tbl>
+          </a:graphicData>
+        </a:graphic>
+      </p:graphicFrame>
+      <p:grpSp>
+        <p:nvGrpSpPr>
+          <p:cNvPr id="26" name="Gruppieren 25">
+            <a:extLst>
+              <a:ext uri="{FF2B5EF4-FFF2-40B4-BE49-F238E27FC236}">
+                <a16:creationId xmlns:a16="http://schemas.microsoft.com/office/drawing/2014/main" id="{23B1D3AB-1973-595B-E021-6FED60DF14A5}"/>
+              </a:ext>
+            </a:extLst>
+          </p:cNvPr>
+          <p:cNvGrpSpPr/>
+          <p:nvPr/>
+        </p:nvGrpSpPr>
+        <p:grpSpPr>
+          <a:xfrm>
+            <a:off x="2949486" y="5243621"/>
+            <a:ext cx="352544" cy="1307733"/>
+            <a:chOff x="3258870" y="2118360"/>
+            <a:chExt cx="352544" cy="1307733"/>
+          </a:xfrm>
+        </p:grpSpPr>
+        <p:pic>
+          <p:nvPicPr>
+            <p:cNvPr id="27" name="Grafik 26">
+              <a:extLst>
+                <a:ext uri="{FF2B5EF4-FFF2-40B4-BE49-F238E27FC236}">
+                  <a16:creationId xmlns:a16="http://schemas.microsoft.com/office/drawing/2014/main" id="{2F2F1EE2-E92D-17AB-F908-04301D773A4B}"/>
+                </a:ext>
+              </a:extLst>
+            </p:cNvPr>
+            <p:cNvPicPr>
+              <a:picLocks noChangeAspect="1"/>
+            </p:cNvPicPr>
+            <p:nvPr/>
+          </p:nvPicPr>
+          <p:blipFill>
+            <a:blip r:embed="rId6"/>
+            <a:stretch>
+              <a:fillRect/>
+            </a:stretch>
+          </p:blipFill>
+          <p:spPr>
+            <a:xfrm>
+              <a:off x="3272172" y="2118360"/>
+              <a:ext cx="339242" cy="354598"/>
+            </a:xfrm>
+            <a:prstGeom prst="rect">
+              <a:avLst/>
+            </a:prstGeom>
+          </p:spPr>
+        </p:pic>
+        <p:pic>
+          <p:nvPicPr>
+            <p:cNvPr id="28" name="Grafik 27">
+              <a:extLst>
+                <a:ext uri="{FF2B5EF4-FFF2-40B4-BE49-F238E27FC236}">
+                  <a16:creationId xmlns:a16="http://schemas.microsoft.com/office/drawing/2014/main" id="{094368D3-22C9-9010-7BC7-0296E530E511}"/>
+                </a:ext>
+              </a:extLst>
+            </p:cNvPr>
+            <p:cNvPicPr>
+              <a:picLocks noChangeAspect="1"/>
+            </p:cNvPicPr>
+            <p:nvPr/>
+          </p:nvPicPr>
+          <p:blipFill>
+            <a:blip r:embed="rId7"/>
+            <a:stretch>
+              <a:fillRect/>
+            </a:stretch>
+          </p:blipFill>
+          <p:spPr>
+            <a:xfrm>
+              <a:off x="3258871" y="2599488"/>
+              <a:ext cx="352543" cy="336774"/>
+            </a:xfrm>
+            <a:prstGeom prst="rect">
+              <a:avLst/>
+            </a:prstGeom>
+          </p:spPr>
+        </p:pic>
+        <p:pic>
+          <p:nvPicPr>
+            <p:cNvPr id="29" name="Grafik 28">
+              <a:extLst>
+                <a:ext uri="{FF2B5EF4-FFF2-40B4-BE49-F238E27FC236}">
+                  <a16:creationId xmlns:a16="http://schemas.microsoft.com/office/drawing/2014/main" id="{51537B40-CDB4-87E5-0747-75F8A004CCE0}"/>
+                </a:ext>
+              </a:extLst>
+            </p:cNvPr>
+            <p:cNvPicPr>
+              <a:picLocks noChangeAspect="1"/>
+            </p:cNvPicPr>
+            <p:nvPr/>
+          </p:nvPicPr>
+          <p:blipFill>
+            <a:blip r:embed="rId8"/>
+            <a:stretch>
+              <a:fillRect/>
+            </a:stretch>
+          </p:blipFill>
+          <p:spPr>
+            <a:xfrm>
+              <a:off x="3258870" y="3078481"/>
+              <a:ext cx="352543" cy="347612"/>
+            </a:xfrm>
+            <a:prstGeom prst="rect">
+              <a:avLst/>
+            </a:prstGeom>
+          </p:spPr>
+        </p:pic>
+      </p:grpSp>
+      <p:pic>
+        <p:nvPicPr>
+          <p:cNvPr id="33" name="Grafik 32">
+            <a:extLst>
+              <a:ext uri="{FF2B5EF4-FFF2-40B4-BE49-F238E27FC236}">
+                <a16:creationId xmlns:a16="http://schemas.microsoft.com/office/drawing/2014/main" id="{06DA0099-2501-2EFD-D78C-93D08C9C464C}"/>
+              </a:ext>
+            </a:extLst>
+          </p:cNvPr>
+          <p:cNvPicPr>
+            <a:picLocks noChangeAspect="1"/>
+          </p:cNvPicPr>
+          <p:nvPr/>
+        </p:nvPicPr>
+        <p:blipFill>
+          <a:blip r:embed="rId9"/>
+          <a:stretch>
+            <a:fillRect/>
+          </a:stretch>
+        </p:blipFill>
+        <p:spPr>
+          <a:xfrm>
+            <a:off x="6071171" y="824706"/>
+            <a:ext cx="3171343" cy="605808"/>
+          </a:xfrm>
+          <a:prstGeom prst="rect">
+            <a:avLst/>
+          </a:prstGeom>
+          <a:effectLst>
+            <a:softEdge rad="63500"/>
+          </a:effectLst>
+        </p:spPr>
+      </p:pic>
+      <p:pic>
+        <p:nvPicPr>
+          <p:cNvPr id="35" name="Grafik 34">
+            <a:extLst>
+              <a:ext uri="{FF2B5EF4-FFF2-40B4-BE49-F238E27FC236}">
+                <a16:creationId xmlns:a16="http://schemas.microsoft.com/office/drawing/2014/main" id="{3CF84602-66EA-9ACC-6B5E-B4DD507C31D5}"/>
+              </a:ext>
+            </a:extLst>
+          </p:cNvPr>
+          <p:cNvPicPr>
+            <a:picLocks noChangeAspect="1"/>
+          </p:cNvPicPr>
+          <p:nvPr/>
+        </p:nvPicPr>
+        <p:blipFill>
+          <a:blip r:embed="rId10"/>
+          <a:stretch>
+            <a:fillRect/>
+          </a:stretch>
+        </p:blipFill>
+        <p:spPr>
+          <a:xfrm>
+            <a:off x="6071171" y="3108105"/>
+            <a:ext cx="3168194" cy="463638"/>
+          </a:xfrm>
+          <a:prstGeom prst="rect">
+            <a:avLst/>
+          </a:prstGeom>
+          <a:effectLst>
+            <a:softEdge rad="63500"/>
+          </a:effectLst>
+        </p:spPr>
+      </p:pic>
+      <p:pic>
+        <p:nvPicPr>
+          <p:cNvPr id="37" name="Grafik 36">
+            <a:extLst>
+              <a:ext uri="{FF2B5EF4-FFF2-40B4-BE49-F238E27FC236}">
+                <a16:creationId xmlns:a16="http://schemas.microsoft.com/office/drawing/2014/main" id="{442CFD27-0FA5-903E-8FB1-9BA0CE047949}"/>
+              </a:ext>
+            </a:extLst>
+          </p:cNvPr>
+          <p:cNvPicPr>
+            <a:picLocks noChangeAspect="1"/>
+          </p:cNvPicPr>
+          <p:nvPr/>
+        </p:nvPicPr>
+        <p:blipFill>
+          <a:blip r:embed="rId11"/>
+          <a:stretch>
+            <a:fillRect/>
+          </a:stretch>
+        </p:blipFill>
+        <p:spPr>
+          <a:xfrm>
+            <a:off x="6084473" y="4956230"/>
+            <a:ext cx="3171343" cy="574781"/>
+          </a:xfrm>
+          <a:prstGeom prst="rect">
+            <a:avLst/>
+          </a:prstGeom>
+          <a:effectLst>
+            <a:softEdge rad="63500"/>
+          </a:effectLst>
+        </p:spPr>
+      </p:pic>
     </p:spTree>
     <p:extLst>
       <p:ext uri="{BB962C8B-B14F-4D97-AF65-F5344CB8AC3E}">
@@ -10073,14 +11641,358 @@
   <p:clrMapOvr>
     <a:masterClrMapping/>
   </p:clrMapOvr>
-  <mc:AlternateContent xmlns:mc="http://schemas.openxmlformats.org/markup-compatibility/2006">
-    <mc:Choice xmlns:p14="http://schemas.microsoft.com/office/powerpoint/2010/main" Requires="p14">
+  <mc:AlternateContent xmlns:mc="http://schemas.openxmlformats.org/markup-compatibility/2006" xmlns:p14="http://schemas.microsoft.com/office/powerpoint/2010/main">
+    <mc:Choice Requires="p14">
       <p:transition spd="slow" p14:dur="2000" advTm="33732"/>
     </mc:Choice>
-    <mc:Fallback>
+    <mc:Fallback xmlns="">
       <p:transition spd="slow" advTm="33732"/>
     </mc:Fallback>
   </mc:AlternateContent>
+  <p:timing>
+    <p:tnLst>
+      <p:par>
+        <p:cTn id="1" dur="indefinite" restart="never" nodeType="tmRoot">
+          <p:childTnLst>
+            <p:seq concurrent="1" nextAc="seek">
+              <p:cTn id="2" dur="indefinite" nodeType="mainSeq">
+                <p:childTnLst>
+                  <p:par>
+                    <p:cTn id="3" fill="hold">
+                      <p:stCondLst>
+                        <p:cond delay="indefinite"/>
+                      </p:stCondLst>
+                      <p:childTnLst>
+                        <p:par>
+                          <p:cTn id="4" fill="hold">
+                            <p:stCondLst>
+                              <p:cond delay="0"/>
+                            </p:stCondLst>
+                            <p:childTnLst>
+                              <p:par>
+                                <p:cTn id="5" presetID="1" presetClass="entr" presetSubtype="0" fill="hold" nodeType="clickEffect">
+                                  <p:stCondLst>
+                                    <p:cond delay="0"/>
+                                  </p:stCondLst>
+                                  <p:childTnLst>
+                                    <p:set>
+                                      <p:cBhvr>
+                                        <p:cTn id="6" dur="1" fill="hold">
+                                          <p:stCondLst>
+                                            <p:cond delay="0"/>
+                                          </p:stCondLst>
+                                        </p:cTn>
+                                        <p:tgtEl>
+                                          <p:spTgt spid="3">
+                                            <p:txEl>
+                                              <p:pRg st="5" end="5"/>
+                                            </p:txEl>
+                                          </p:spTgt>
+                                        </p:tgtEl>
+                                        <p:attrNameLst>
+                                          <p:attrName>style.visibility</p:attrName>
+                                        </p:attrNameLst>
+                                      </p:cBhvr>
+                                      <p:to>
+                                        <p:strVal val="visible"/>
+                                      </p:to>
+                                    </p:set>
+                                  </p:childTnLst>
+                                </p:cTn>
+                              </p:par>
+                              <p:par>
+                                <p:cTn id="7" presetID="1" presetClass="entr" presetSubtype="0" fill="hold" nodeType="withEffect">
+                                  <p:stCondLst>
+                                    <p:cond delay="0"/>
+                                  </p:stCondLst>
+                                  <p:childTnLst>
+                                    <p:set>
+                                      <p:cBhvr>
+                                        <p:cTn id="8" dur="1" fill="hold">
+                                          <p:stCondLst>
+                                            <p:cond delay="0"/>
+                                          </p:stCondLst>
+                                        </p:cTn>
+                                        <p:tgtEl>
+                                          <p:spTgt spid="21"/>
+                                        </p:tgtEl>
+                                        <p:attrNameLst>
+                                          <p:attrName>style.visibility</p:attrName>
+                                        </p:attrNameLst>
+                                      </p:cBhvr>
+                                      <p:to>
+                                        <p:strVal val="visible"/>
+                                      </p:to>
+                                    </p:set>
+                                  </p:childTnLst>
+                                </p:cTn>
+                              </p:par>
+                              <p:par>
+                                <p:cTn id="9" presetID="1" presetClass="entr" presetSubtype="0" fill="hold" nodeType="withEffect">
+                                  <p:stCondLst>
+                                    <p:cond delay="0"/>
+                                  </p:stCondLst>
+                                  <p:childTnLst>
+                                    <p:set>
+                                      <p:cBhvr>
+                                        <p:cTn id="10" dur="1" fill="hold">
+                                          <p:stCondLst>
+                                            <p:cond delay="0"/>
+                                          </p:stCondLst>
+                                        </p:cTn>
+                                        <p:tgtEl>
+                                          <p:spTgt spid="20"/>
+                                        </p:tgtEl>
+                                        <p:attrNameLst>
+                                          <p:attrName>style.visibility</p:attrName>
+                                        </p:attrNameLst>
+                                      </p:cBhvr>
+                                      <p:to>
+                                        <p:strVal val="visible"/>
+                                      </p:to>
+                                    </p:set>
+                                  </p:childTnLst>
+                                </p:cTn>
+                              </p:par>
+                              <p:par>
+                                <p:cTn id="11" presetID="1" presetClass="entr" presetSubtype="0" fill="hold" nodeType="withEffect">
+                                  <p:stCondLst>
+                                    <p:cond delay="0"/>
+                                  </p:stCondLst>
+                                  <p:childTnLst>
+                                    <p:set>
+                                      <p:cBhvr>
+                                        <p:cTn id="12" dur="1" fill="hold">
+                                          <p:stCondLst>
+                                            <p:cond delay="0"/>
+                                          </p:stCondLst>
+                                        </p:cTn>
+                                        <p:tgtEl>
+                                          <p:spTgt spid="8"/>
+                                        </p:tgtEl>
+                                        <p:attrNameLst>
+                                          <p:attrName>style.visibility</p:attrName>
+                                        </p:attrNameLst>
+                                      </p:cBhvr>
+                                      <p:to>
+                                        <p:strVal val="visible"/>
+                                      </p:to>
+                                    </p:set>
+                                  </p:childTnLst>
+                                </p:cTn>
+                              </p:par>
+                              <p:par>
+                                <p:cTn id="13" presetID="1" presetClass="entr" presetSubtype="0" fill="hold" nodeType="withEffect">
+                                  <p:stCondLst>
+                                    <p:cond delay="0"/>
+                                  </p:stCondLst>
+                                  <p:childTnLst>
+                                    <p:set>
+                                      <p:cBhvr>
+                                        <p:cTn id="14" dur="1" fill="hold">
+                                          <p:stCondLst>
+                                            <p:cond delay="0"/>
+                                          </p:stCondLst>
+                                        </p:cTn>
+                                        <p:tgtEl>
+                                          <p:spTgt spid="35"/>
+                                        </p:tgtEl>
+                                        <p:attrNameLst>
+                                          <p:attrName>style.visibility</p:attrName>
+                                        </p:attrNameLst>
+                                      </p:cBhvr>
+                                      <p:to>
+                                        <p:strVal val="visible"/>
+                                      </p:to>
+                                    </p:set>
+                                  </p:childTnLst>
+                                </p:cTn>
+                              </p:par>
+                            </p:childTnLst>
+                          </p:cTn>
+                        </p:par>
+                      </p:childTnLst>
+                    </p:cTn>
+                  </p:par>
+                  <p:par>
+                    <p:cTn id="15" fill="hold">
+                      <p:stCondLst>
+                        <p:cond delay="indefinite"/>
+                      </p:stCondLst>
+                      <p:childTnLst>
+                        <p:par>
+                          <p:cTn id="16" fill="hold">
+                            <p:stCondLst>
+                              <p:cond delay="0"/>
+                            </p:stCondLst>
+                            <p:childTnLst>
+                              <p:par>
+                                <p:cTn id="17" presetID="1" presetClass="entr" presetSubtype="0" fill="hold" nodeType="clickEffect">
+                                  <p:stCondLst>
+                                    <p:cond delay="0"/>
+                                  </p:stCondLst>
+                                  <p:childTnLst>
+                                    <p:set>
+                                      <p:cBhvr>
+                                        <p:cTn id="18" dur="1" fill="hold">
+                                          <p:stCondLst>
+                                            <p:cond delay="0"/>
+                                          </p:stCondLst>
+                                        </p:cTn>
+                                        <p:tgtEl>
+                                          <p:spTgt spid="3">
+                                            <p:txEl>
+                                              <p:pRg st="10" end="10"/>
+                                            </p:txEl>
+                                          </p:spTgt>
+                                        </p:tgtEl>
+                                        <p:attrNameLst>
+                                          <p:attrName>style.visibility</p:attrName>
+                                        </p:attrNameLst>
+                                      </p:cBhvr>
+                                      <p:to>
+                                        <p:strVal val="visible"/>
+                                      </p:to>
+                                    </p:set>
+                                  </p:childTnLst>
+                                </p:cTn>
+                              </p:par>
+                              <p:par>
+                                <p:cTn id="19" presetID="1" presetClass="entr" presetSubtype="0" fill="hold" nodeType="withEffect">
+                                  <p:stCondLst>
+                                    <p:cond delay="0"/>
+                                  </p:stCondLst>
+                                  <p:childTnLst>
+                                    <p:set>
+                                      <p:cBhvr>
+                                        <p:cTn id="20" dur="1" fill="hold">
+                                          <p:stCondLst>
+                                            <p:cond delay="0"/>
+                                          </p:stCondLst>
+                                        </p:cTn>
+                                        <p:tgtEl>
+                                          <p:spTgt spid="26"/>
+                                        </p:tgtEl>
+                                        <p:attrNameLst>
+                                          <p:attrName>style.visibility</p:attrName>
+                                        </p:attrNameLst>
+                                      </p:cBhvr>
+                                      <p:to>
+                                        <p:strVal val="visible"/>
+                                      </p:to>
+                                    </p:set>
+                                  </p:childTnLst>
+                                </p:cTn>
+                              </p:par>
+                              <p:par>
+                                <p:cTn id="21" presetID="1" presetClass="entr" presetSubtype="0" fill="hold" nodeType="withEffect">
+                                  <p:stCondLst>
+                                    <p:cond delay="0"/>
+                                  </p:stCondLst>
+                                  <p:childTnLst>
+                                    <p:set>
+                                      <p:cBhvr>
+                                        <p:cTn id="22" dur="1" fill="hold">
+                                          <p:stCondLst>
+                                            <p:cond delay="0"/>
+                                          </p:stCondLst>
+                                        </p:cTn>
+                                        <p:tgtEl>
+                                          <p:spTgt spid="25"/>
+                                        </p:tgtEl>
+                                        <p:attrNameLst>
+                                          <p:attrName>style.visibility</p:attrName>
+                                        </p:attrNameLst>
+                                      </p:cBhvr>
+                                      <p:to>
+                                        <p:strVal val="visible"/>
+                                      </p:to>
+                                    </p:set>
+                                  </p:childTnLst>
+                                </p:cTn>
+                              </p:par>
+                              <p:par>
+                                <p:cTn id="23" presetID="1" presetClass="entr" presetSubtype="0" fill="hold" nodeType="withEffect">
+                                  <p:stCondLst>
+                                    <p:cond delay="0"/>
+                                  </p:stCondLst>
+                                  <p:childTnLst>
+                                    <p:set>
+                                      <p:cBhvr>
+                                        <p:cTn id="24" dur="1" fill="hold">
+                                          <p:stCondLst>
+                                            <p:cond delay="0"/>
+                                          </p:stCondLst>
+                                        </p:cTn>
+                                        <p:tgtEl>
+                                          <p:spTgt spid="10"/>
+                                        </p:tgtEl>
+                                        <p:attrNameLst>
+                                          <p:attrName>style.visibility</p:attrName>
+                                        </p:attrNameLst>
+                                      </p:cBhvr>
+                                      <p:to>
+                                        <p:strVal val="visible"/>
+                                      </p:to>
+                                    </p:set>
+                                  </p:childTnLst>
+                                </p:cTn>
+                              </p:par>
+                              <p:par>
+                                <p:cTn id="25" presetID="1" presetClass="entr" presetSubtype="0" fill="hold" nodeType="withEffect">
+                                  <p:stCondLst>
+                                    <p:cond delay="0"/>
+                                  </p:stCondLst>
+                                  <p:childTnLst>
+                                    <p:set>
+                                      <p:cBhvr>
+                                        <p:cTn id="26" dur="1" fill="hold">
+                                          <p:stCondLst>
+                                            <p:cond delay="0"/>
+                                          </p:stCondLst>
+                                        </p:cTn>
+                                        <p:tgtEl>
+                                          <p:spTgt spid="37"/>
+                                        </p:tgtEl>
+                                        <p:attrNameLst>
+                                          <p:attrName>style.visibility</p:attrName>
+                                        </p:attrNameLst>
+                                      </p:cBhvr>
+                                      <p:to>
+                                        <p:strVal val="visible"/>
+                                      </p:to>
+                                    </p:set>
+                                  </p:childTnLst>
+                                </p:cTn>
+                              </p:par>
+                            </p:childTnLst>
+                          </p:cTn>
+                        </p:par>
+                      </p:childTnLst>
+                    </p:cTn>
+                  </p:par>
+                </p:childTnLst>
+              </p:cTn>
+              <p:prevCondLst>
+                <p:cond evt="onPrev" delay="0">
+                  <p:tgtEl>
+                    <p:sldTgt/>
+                  </p:tgtEl>
+                </p:cond>
+              </p:prevCondLst>
+              <p:nextCondLst>
+                <p:cond evt="onNext" delay="0">
+                  <p:tgtEl>
+                    <p:sldTgt/>
+                  </p:tgtEl>
+                </p:cond>
+              </p:nextCondLst>
+            </p:seq>
+          </p:childTnLst>
+        </p:cTn>
+      </p:par>
+    </p:tnLst>
+  </p:timing>
 </p:sld>
 </file>
 
@@ -10124,39 +12036,15 @@
           <a:p>
             <a:r>
               <a:rPr lang="de-CH" dirty="0"/>
-              <a:t>Tools</a:t>
-            </a:r>
-          </a:p>
-        </p:txBody>
-      </p:sp>
-      <p:sp>
-        <p:nvSpPr>
-          <p:cNvPr id="3" name="Inhaltsplatzhalter 2">
-            <a:extLst>
-              <a:ext uri="{FF2B5EF4-FFF2-40B4-BE49-F238E27FC236}">
-                <a16:creationId xmlns:a16="http://schemas.microsoft.com/office/drawing/2014/main" id="{09E0D5C9-0C59-5FA1-1DB3-BCB8B158C9EF}"/>
-              </a:ext>
-            </a:extLst>
-          </p:cNvPr>
-          <p:cNvSpPr>
-            <a:spLocks noGrp="1"/>
-          </p:cNvSpPr>
-          <p:nvPr>
-            <p:ph idx="1"/>
-          </p:nvPr>
-        </p:nvSpPr>
-        <p:spPr/>
-        <p:txBody>
-          <a:bodyPr>
-            <a:normAutofit/>
-          </a:bodyPr>
-          <a:lstStyle/>
-          <a:p>
-            <a:r>
-              <a:rPr lang="de-CH" dirty="0" err="1"/>
-              <a:t>Webmin</a:t>
-            </a:r>
-            <a:endParaRPr lang="de-CH" dirty="0"/>
+              <a:t>Metriken</a:t>
+            </a:r>
+            <a:br>
+              <a:rPr lang="de-CH" dirty="0"/>
+            </a:br>
+            <a:r>
+              <a:rPr lang="de-CH" sz="2400" dirty="0"/>
+              <a:t>Test</a:t>
+            </a:r>
           </a:p>
         </p:txBody>
       </p:sp>
@@ -10189,10 +12077,62 @@
           </a:p>
         </p:txBody>
       </p:sp>
+      <p:sp>
+        <p:nvSpPr>
+          <p:cNvPr id="3" name="Inhaltsplatzhalter 2">
+            <a:extLst>
+              <a:ext uri="{FF2B5EF4-FFF2-40B4-BE49-F238E27FC236}">
+                <a16:creationId xmlns:a16="http://schemas.microsoft.com/office/drawing/2014/main" id="{FCBDCF8F-C1B1-365E-56BF-73B72560707E}"/>
+              </a:ext>
+            </a:extLst>
+          </p:cNvPr>
+          <p:cNvSpPr>
+            <a:spLocks noGrp="1"/>
+          </p:cNvSpPr>
+          <p:nvPr>
+            <p:ph idx="1"/>
+          </p:nvPr>
+        </p:nvSpPr>
+        <p:spPr>
+          <a:xfrm>
+            <a:off x="677334" y="2160589"/>
+            <a:ext cx="8596668" cy="4437236"/>
+          </a:xfrm>
+        </p:spPr>
+        <p:txBody>
+          <a:bodyPr>
+            <a:normAutofit/>
+          </a:bodyPr>
+          <a:lstStyle/>
+          <a:p>
+            <a:pPr>
+              <a:tabLst>
+                <a:tab pos="3586163" algn="l"/>
+              </a:tabLst>
+            </a:pPr>
+            <a:r>
+              <a:rPr lang="de-CH"/>
+              <a:t>Anzahl Code-Zeilen?</a:t>
+            </a:r>
+            <a:endParaRPr lang="de-CH" dirty="0"/>
+          </a:p>
+          <a:p>
+            <a:pPr>
+              <a:tabLst>
+                <a:tab pos="3586163" algn="l"/>
+              </a:tabLst>
+            </a:pPr>
+            <a:r>
+              <a:rPr lang="de-CH" dirty="0"/>
+              <a:t>Test Coverage</a:t>
+            </a:r>
+          </a:p>
+        </p:txBody>
+      </p:sp>
     </p:spTree>
     <p:extLst>
       <p:ext uri="{BB962C8B-B14F-4D97-AF65-F5344CB8AC3E}">
-        <p14:creationId xmlns:p14="http://schemas.microsoft.com/office/powerpoint/2010/main" val="2989430939"/>
+        <p14:creationId xmlns:p14="http://schemas.microsoft.com/office/powerpoint/2010/main" val="2186905519"/>
       </p:ext>
     </p:extLst>
   </p:cSld>
@@ -10250,35 +12190,15 @@
           <a:p>
             <a:r>
               <a:rPr lang="de-CH" dirty="0"/>
-              <a:t>Reflexion</a:t>
-            </a:r>
-          </a:p>
-        </p:txBody>
-      </p:sp>
-      <p:sp>
-        <p:nvSpPr>
-          <p:cNvPr id="3" name="Inhaltsplatzhalter 2">
-            <a:extLst>
-              <a:ext uri="{FF2B5EF4-FFF2-40B4-BE49-F238E27FC236}">
-                <a16:creationId xmlns:a16="http://schemas.microsoft.com/office/drawing/2014/main" id="{09E0D5C9-0C59-5FA1-1DB3-BCB8B158C9EF}"/>
-              </a:ext>
-            </a:extLst>
-          </p:cNvPr>
-          <p:cNvSpPr>
-            <a:spLocks noGrp="1"/>
-          </p:cNvSpPr>
-          <p:nvPr>
-            <p:ph idx="1"/>
-          </p:nvPr>
-        </p:nvSpPr>
-        <p:spPr/>
-        <p:txBody>
-          <a:bodyPr>
-            <a:normAutofit/>
-          </a:bodyPr>
-          <a:lstStyle/>
-          <a:p>
-            <a:endParaRPr lang="de-CH" dirty="0"/>
+              <a:t>Metriken</a:t>
+            </a:r>
+            <a:br>
+              <a:rPr lang="de-CH" dirty="0"/>
+            </a:br>
+            <a:r>
+              <a:rPr lang="de-CH" sz="2400" dirty="0"/>
+              <a:t>Projekt</a:t>
+            </a:r>
           </a:p>
         </p:txBody>
       </p:sp>
@@ -10311,21 +12231,121 @@
           </a:p>
         </p:txBody>
       </p:sp>
+      <p:sp>
+        <p:nvSpPr>
+          <p:cNvPr id="3" name="Inhaltsplatzhalter 2">
+            <a:extLst>
+              <a:ext uri="{FF2B5EF4-FFF2-40B4-BE49-F238E27FC236}">
+                <a16:creationId xmlns:a16="http://schemas.microsoft.com/office/drawing/2014/main" id="{FCBDCF8F-C1B1-365E-56BF-73B72560707E}"/>
+              </a:ext>
+            </a:extLst>
+          </p:cNvPr>
+          <p:cNvSpPr>
+            <a:spLocks noGrp="1"/>
+          </p:cNvSpPr>
+          <p:nvPr>
+            <p:ph idx="1"/>
+          </p:nvPr>
+        </p:nvSpPr>
+        <p:spPr>
+          <a:xfrm>
+            <a:off x="677334" y="2160589"/>
+            <a:ext cx="8596668" cy="4437236"/>
+          </a:xfrm>
+        </p:spPr>
+        <p:txBody>
+          <a:bodyPr>
+            <a:normAutofit/>
+          </a:bodyPr>
+          <a:lstStyle/>
+          <a:p>
+            <a:pPr>
+              <a:tabLst>
+                <a:tab pos="3586163" algn="l"/>
+              </a:tabLst>
+            </a:pPr>
+            <a:r>
+              <a:rPr lang="de-CH" dirty="0"/>
+              <a:t>Allgemein:</a:t>
+            </a:r>
+          </a:p>
+          <a:p>
+            <a:pPr lvl="1">
+              <a:tabLst>
+                <a:tab pos="3586163" algn="l"/>
+              </a:tabLst>
+            </a:pPr>
+            <a:r>
+              <a:rPr lang="de-CH" dirty="0"/>
+              <a:t>Anzahl Tickets</a:t>
+            </a:r>
+          </a:p>
+          <a:p>
+            <a:pPr lvl="1">
+              <a:tabLst>
+                <a:tab pos="3586163" algn="l"/>
+              </a:tabLst>
+            </a:pPr>
+            <a:r>
+              <a:rPr lang="de-CH" dirty="0"/>
+              <a:t>Anzahl Sprints</a:t>
+            </a:r>
+          </a:p>
+          <a:p>
+            <a:pPr lvl="1">
+              <a:tabLst>
+                <a:tab pos="3586163" algn="l"/>
+              </a:tabLst>
+            </a:pPr>
+            <a:r>
+              <a:rPr lang="de-CH" dirty="0"/>
+              <a:t>Flussdiagramm (Anzahl Tickets)</a:t>
+            </a:r>
+          </a:p>
+          <a:p>
+            <a:pPr lvl="1">
+              <a:tabLst>
+                <a:tab pos="3586163" algn="l"/>
+              </a:tabLst>
+            </a:pPr>
+            <a:r>
+              <a:rPr lang="de-CH" dirty="0">
+                <a:sym typeface="Wingdings" panose="05000000000000000000" pitchFamily="2" charset="2"/>
+              </a:rPr>
+              <a:t> Zeitauswertung</a:t>
+            </a:r>
+          </a:p>
+          <a:p>
+            <a:pPr lvl="1">
+              <a:tabLst>
+                <a:tab pos="3586163" algn="l"/>
+              </a:tabLst>
+            </a:pPr>
+            <a:r>
+              <a:rPr lang="de-CH" dirty="0">
+                <a:sym typeface="Wingdings" panose="05000000000000000000" pitchFamily="2" charset="2"/>
+              </a:rPr>
+              <a:t>Aufteilung Zeit, Verhältnis zu Allgemein / Implementation</a:t>
+            </a:r>
+            <a:endParaRPr lang="de-CH" dirty="0"/>
+          </a:p>
+        </p:txBody>
+      </p:sp>
     </p:spTree>
     <p:extLst>
       <p:ext uri="{BB962C8B-B14F-4D97-AF65-F5344CB8AC3E}">
-        <p14:creationId xmlns:p14="http://schemas.microsoft.com/office/powerpoint/2010/main" val="1602808593"/>
+        <p14:creationId xmlns:p14="http://schemas.microsoft.com/office/powerpoint/2010/main" val="4035289624"/>
       </p:ext>
     </p:extLst>
   </p:cSld>
   <p:clrMapOvr>
     <a:masterClrMapping/>
   </p:clrMapOvr>
-  <mc:AlternateContent xmlns:mc="http://schemas.openxmlformats.org/markup-compatibility/2006" xmlns:p14="http://schemas.microsoft.com/office/powerpoint/2010/main">
-    <mc:Choice Requires="p14">
+  <mc:AlternateContent xmlns:mc="http://schemas.openxmlformats.org/markup-compatibility/2006">
+    <mc:Choice xmlns:p14="http://schemas.microsoft.com/office/powerpoint/2010/main" Requires="p14">
       <p:transition spd="slow" p14:dur="2000" advTm="33732"/>
     </mc:Choice>
-    <mc:Fallback xmlns="">
+    <mc:Fallback>
       <p:transition spd="slow" advTm="33732"/>
     </mc:Fallback>
   </mc:AlternateContent>
@@ -10555,7 +12575,7 @@
           <a:p>
             <a:r>
               <a:rPr lang="de-CH" dirty="0"/>
-              <a:t>Ausblick</a:t>
+              <a:t>Tools</a:t>
             </a:r>
           </a:p>
         </p:txBody>
@@ -10583,6 +12603,10 @@
           </a:bodyPr>
           <a:lstStyle/>
           <a:p>
+            <a:r>
+              <a:rPr lang="de-CH" dirty="0" err="1"/>
+              <a:t>Webmin</a:t>
+            </a:r>
             <a:endParaRPr lang="de-CH" dirty="0"/>
           </a:p>
         </p:txBody>
@@ -10619,7 +12643,7 @@
     </p:spTree>
     <p:extLst>
       <p:ext uri="{BB962C8B-B14F-4D97-AF65-F5344CB8AC3E}">
-        <p14:creationId xmlns:p14="http://schemas.microsoft.com/office/powerpoint/2010/main" val="3981414043"/>
+        <p14:creationId xmlns:p14="http://schemas.microsoft.com/office/powerpoint/2010/main" val="2989430939"/>
       </p:ext>
     </p:extLst>
   </p:cSld>
@@ -10659,6 +12683,250 @@
           <p:cNvPr id="2" name="Titel 1">
             <a:extLst>
               <a:ext uri="{FF2B5EF4-FFF2-40B4-BE49-F238E27FC236}">
+                <a16:creationId xmlns:a16="http://schemas.microsoft.com/office/drawing/2014/main" id="{4886BDED-F105-DAAB-E82A-B1D3D48B7306}"/>
+              </a:ext>
+            </a:extLst>
+          </p:cNvPr>
+          <p:cNvSpPr>
+            <a:spLocks noGrp="1"/>
+          </p:cNvSpPr>
+          <p:nvPr>
+            <p:ph type="title"/>
+          </p:nvPr>
+        </p:nvSpPr>
+        <p:spPr/>
+        <p:txBody>
+          <a:bodyPr/>
+          <a:lstStyle/>
+          <a:p>
+            <a:r>
+              <a:rPr lang="de-CH" dirty="0"/>
+              <a:t>Reflexion</a:t>
+            </a:r>
+          </a:p>
+        </p:txBody>
+      </p:sp>
+      <p:sp>
+        <p:nvSpPr>
+          <p:cNvPr id="3" name="Inhaltsplatzhalter 2">
+            <a:extLst>
+              <a:ext uri="{FF2B5EF4-FFF2-40B4-BE49-F238E27FC236}">
+                <a16:creationId xmlns:a16="http://schemas.microsoft.com/office/drawing/2014/main" id="{09E0D5C9-0C59-5FA1-1DB3-BCB8B158C9EF}"/>
+              </a:ext>
+            </a:extLst>
+          </p:cNvPr>
+          <p:cNvSpPr>
+            <a:spLocks noGrp="1"/>
+          </p:cNvSpPr>
+          <p:nvPr>
+            <p:ph idx="1"/>
+          </p:nvPr>
+        </p:nvSpPr>
+        <p:spPr/>
+        <p:txBody>
+          <a:bodyPr>
+            <a:normAutofit/>
+          </a:bodyPr>
+          <a:lstStyle/>
+          <a:p>
+            <a:endParaRPr lang="de-CH" dirty="0"/>
+          </a:p>
+        </p:txBody>
+      </p:sp>
+      <p:sp>
+        <p:nvSpPr>
+          <p:cNvPr id="5" name="Foliennummernplatzhalter 4">
+            <a:extLst>
+              <a:ext uri="{FF2B5EF4-FFF2-40B4-BE49-F238E27FC236}">
+                <a16:creationId xmlns:a16="http://schemas.microsoft.com/office/drawing/2014/main" id="{D78B2001-0582-AF5C-73E0-D0C52A58F0B5}"/>
+              </a:ext>
+            </a:extLst>
+          </p:cNvPr>
+          <p:cNvSpPr>
+            <a:spLocks noGrp="1"/>
+          </p:cNvSpPr>
+          <p:nvPr>
+            <p:ph type="sldNum" sz="quarter" idx="12"/>
+          </p:nvPr>
+        </p:nvSpPr>
+        <p:spPr/>
+        <p:txBody>
+          <a:bodyPr/>
+          <a:lstStyle/>
+          <a:p>
+            <a:fld id="{C5C4FCA5-2BB8-425C-AF71-2DCCD7874011}" type="slidenum">
+              <a:rPr lang="de-CH" smtClean="0"/>
+              <a:t>21</a:t>
+            </a:fld>
+            <a:endParaRPr lang="de-CH"/>
+          </a:p>
+        </p:txBody>
+      </p:sp>
+    </p:spTree>
+    <p:extLst>
+      <p:ext uri="{BB962C8B-B14F-4D97-AF65-F5344CB8AC3E}">
+        <p14:creationId xmlns:p14="http://schemas.microsoft.com/office/powerpoint/2010/main" val="1602808593"/>
+      </p:ext>
+    </p:extLst>
+  </p:cSld>
+  <p:clrMapOvr>
+    <a:masterClrMapping/>
+  </p:clrMapOvr>
+  <mc:AlternateContent xmlns:mc="http://schemas.openxmlformats.org/markup-compatibility/2006" xmlns:p14="http://schemas.microsoft.com/office/powerpoint/2010/main">
+    <mc:Choice Requires="p14">
+      <p:transition spd="slow" p14:dur="2000" advTm="33732"/>
+    </mc:Choice>
+    <mc:Fallback xmlns="">
+      <p:transition spd="slow" advTm="33732"/>
+    </mc:Fallback>
+  </mc:AlternateContent>
+</p:sld>
+</file>
+
+<file path=ppt/slides/slide22.xml><?xml version="1.0" encoding="utf-8"?>
+<p:sld xmlns:a="http://schemas.openxmlformats.org/drawingml/2006/main" xmlns:r="http://schemas.openxmlformats.org/officeDocument/2006/relationships" xmlns:p="http://schemas.openxmlformats.org/presentationml/2006/main">
+  <p:cSld>
+    <p:spTree>
+      <p:nvGrpSpPr>
+        <p:cNvPr id="1" name=""/>
+        <p:cNvGrpSpPr/>
+        <p:nvPr/>
+      </p:nvGrpSpPr>
+      <p:grpSpPr>
+        <a:xfrm>
+          <a:off x="0" y="0"/>
+          <a:ext cx="0" cy="0"/>
+          <a:chOff x="0" y="0"/>
+          <a:chExt cx="0" cy="0"/>
+        </a:xfrm>
+      </p:grpSpPr>
+      <p:sp>
+        <p:nvSpPr>
+          <p:cNvPr id="2" name="Titel 1">
+            <a:extLst>
+              <a:ext uri="{FF2B5EF4-FFF2-40B4-BE49-F238E27FC236}">
+                <a16:creationId xmlns:a16="http://schemas.microsoft.com/office/drawing/2014/main" id="{4886BDED-F105-DAAB-E82A-B1D3D48B7306}"/>
+              </a:ext>
+            </a:extLst>
+          </p:cNvPr>
+          <p:cNvSpPr>
+            <a:spLocks noGrp="1"/>
+          </p:cNvSpPr>
+          <p:nvPr>
+            <p:ph type="title"/>
+          </p:nvPr>
+        </p:nvSpPr>
+        <p:spPr/>
+        <p:txBody>
+          <a:bodyPr/>
+          <a:lstStyle/>
+          <a:p>
+            <a:r>
+              <a:rPr lang="de-CH" dirty="0"/>
+              <a:t>Ausblick</a:t>
+            </a:r>
+          </a:p>
+        </p:txBody>
+      </p:sp>
+      <p:sp>
+        <p:nvSpPr>
+          <p:cNvPr id="3" name="Inhaltsplatzhalter 2">
+            <a:extLst>
+              <a:ext uri="{FF2B5EF4-FFF2-40B4-BE49-F238E27FC236}">
+                <a16:creationId xmlns:a16="http://schemas.microsoft.com/office/drawing/2014/main" id="{09E0D5C9-0C59-5FA1-1DB3-BCB8B158C9EF}"/>
+              </a:ext>
+            </a:extLst>
+          </p:cNvPr>
+          <p:cNvSpPr>
+            <a:spLocks noGrp="1"/>
+          </p:cNvSpPr>
+          <p:nvPr>
+            <p:ph idx="1"/>
+          </p:nvPr>
+        </p:nvSpPr>
+        <p:spPr/>
+        <p:txBody>
+          <a:bodyPr>
+            <a:normAutofit/>
+          </a:bodyPr>
+          <a:lstStyle/>
+          <a:p>
+            <a:endParaRPr lang="de-CH" dirty="0"/>
+          </a:p>
+        </p:txBody>
+      </p:sp>
+      <p:sp>
+        <p:nvSpPr>
+          <p:cNvPr id="5" name="Foliennummernplatzhalter 4">
+            <a:extLst>
+              <a:ext uri="{FF2B5EF4-FFF2-40B4-BE49-F238E27FC236}">
+                <a16:creationId xmlns:a16="http://schemas.microsoft.com/office/drawing/2014/main" id="{D78B2001-0582-AF5C-73E0-D0C52A58F0B5}"/>
+              </a:ext>
+            </a:extLst>
+          </p:cNvPr>
+          <p:cNvSpPr>
+            <a:spLocks noGrp="1"/>
+          </p:cNvSpPr>
+          <p:nvPr>
+            <p:ph type="sldNum" sz="quarter" idx="12"/>
+          </p:nvPr>
+        </p:nvSpPr>
+        <p:spPr/>
+        <p:txBody>
+          <a:bodyPr/>
+          <a:lstStyle/>
+          <a:p>
+            <a:fld id="{C5C4FCA5-2BB8-425C-AF71-2DCCD7874011}" type="slidenum">
+              <a:rPr lang="de-CH" smtClean="0"/>
+              <a:t>22</a:t>
+            </a:fld>
+            <a:endParaRPr lang="de-CH"/>
+          </a:p>
+        </p:txBody>
+      </p:sp>
+    </p:spTree>
+    <p:extLst>
+      <p:ext uri="{BB962C8B-B14F-4D97-AF65-F5344CB8AC3E}">
+        <p14:creationId xmlns:p14="http://schemas.microsoft.com/office/powerpoint/2010/main" val="3981414043"/>
+      </p:ext>
+    </p:extLst>
+  </p:cSld>
+  <p:clrMapOvr>
+    <a:masterClrMapping/>
+  </p:clrMapOvr>
+  <mc:AlternateContent xmlns:mc="http://schemas.openxmlformats.org/markup-compatibility/2006" xmlns:p14="http://schemas.microsoft.com/office/powerpoint/2010/main">
+    <mc:Choice Requires="p14">
+      <p:transition spd="slow" p14:dur="2000" advTm="33732"/>
+    </mc:Choice>
+    <mc:Fallback xmlns="">
+      <p:transition spd="slow" advTm="33732"/>
+    </mc:Fallback>
+  </mc:AlternateContent>
+</p:sld>
+</file>
+
+<file path=ppt/slides/slide23.xml><?xml version="1.0" encoding="utf-8"?>
+<p:sld xmlns:a="http://schemas.openxmlformats.org/drawingml/2006/main" xmlns:r="http://schemas.openxmlformats.org/officeDocument/2006/relationships" xmlns:p="http://schemas.openxmlformats.org/presentationml/2006/main">
+  <p:cSld>
+    <p:spTree>
+      <p:nvGrpSpPr>
+        <p:cNvPr id="1" name=""/>
+        <p:cNvGrpSpPr/>
+        <p:nvPr/>
+      </p:nvGrpSpPr>
+      <p:grpSpPr>
+        <a:xfrm>
+          <a:off x="0" y="0"/>
+          <a:ext cx="0" cy="0"/>
+          <a:chOff x="0" y="0"/>
+          <a:chExt cx="0" cy="0"/>
+        </a:xfrm>
+      </p:grpSpPr>
+      <p:sp>
+        <p:nvSpPr>
+          <p:cNvPr id="2" name="Titel 1">
+            <a:extLst>
+              <a:ext uri="{FF2B5EF4-FFF2-40B4-BE49-F238E27FC236}">
                 <a16:creationId xmlns:a16="http://schemas.microsoft.com/office/drawing/2014/main" id="{D484557B-1171-F5AA-820A-7AC30E7CB552}"/>
               </a:ext>
             </a:extLst>
@@ -10703,7 +12971,7 @@
 </p:sld>
 </file>
 
-<file path=ppt/slides/slide22.xml><?xml version="1.0" encoding="utf-8"?>
+<file path=ppt/slides/slide24.xml><?xml version="1.0" encoding="utf-8"?>
 <p:sld xmlns:a="http://schemas.openxmlformats.org/drawingml/2006/main" xmlns:r="http://schemas.openxmlformats.org/officeDocument/2006/relationships" xmlns:p="http://schemas.openxmlformats.org/presentationml/2006/main">
   <p:cSld>
     <p:spTree>
@@ -11616,11 +13884,11 @@
   <p:clrMapOvr>
     <a:masterClrMapping/>
   </p:clrMapOvr>
-  <mc:AlternateContent xmlns:mc="http://schemas.openxmlformats.org/markup-compatibility/2006">
-    <mc:Choice xmlns:p14="http://schemas.microsoft.com/office/powerpoint/2010/main" Requires="p14">
+  <mc:AlternateContent xmlns:mc="http://schemas.openxmlformats.org/markup-compatibility/2006" xmlns:p14="http://schemas.microsoft.com/office/powerpoint/2010/main">
+    <mc:Choice Requires="p14">
       <p:transition spd="slow" p14:dur="2000" advTm="33732"/>
     </mc:Choice>
-    <mc:Fallback>
+    <mc:Fallback xmlns="">
       <p:transition spd="slow" advTm="33732"/>
     </mc:Fallback>
   </mc:AlternateContent>
@@ -12638,11 +14906,11 @@
   <p:clrMapOvr>
     <a:masterClrMapping/>
   </p:clrMapOvr>
-  <mc:AlternateContent xmlns:mc="http://schemas.openxmlformats.org/markup-compatibility/2006">
-    <mc:Choice xmlns:p14="http://schemas.microsoft.com/office/powerpoint/2010/main" Requires="p14">
+  <mc:AlternateContent xmlns:mc="http://schemas.openxmlformats.org/markup-compatibility/2006" xmlns:p14="http://schemas.microsoft.com/office/powerpoint/2010/main">
+    <mc:Choice Requires="p14">
       <p:transition spd="slow" p14:dur="2000" advTm="33732"/>
     </mc:Choice>
-    <mc:Fallback>
+    <mc:Fallback xmlns="">
       <p:transition spd="slow" advTm="33732"/>
     </mc:Fallback>
   </mc:AlternateContent>
@@ -13005,11 +15273,11 @@
   <p:clrMapOvr>
     <a:masterClrMapping/>
   </p:clrMapOvr>
-  <mc:AlternateContent xmlns:mc="http://schemas.openxmlformats.org/markup-compatibility/2006">
-    <mc:Choice xmlns:p14="http://schemas.microsoft.com/office/powerpoint/2010/main" Requires="p14">
+  <mc:AlternateContent xmlns:mc="http://schemas.openxmlformats.org/markup-compatibility/2006" xmlns:p14="http://schemas.microsoft.com/office/powerpoint/2010/main">
+    <mc:Choice Requires="p14">
       <p:transition spd="slow" p14:dur="2000" advTm="33732"/>
     </mc:Choice>
-    <mc:Fallback>
+    <mc:Fallback xmlns="">
       <p:transition spd="slow" advTm="33732"/>
     </mc:Fallback>
   </mc:AlternateContent>
@@ -13578,12 +15846,6 @@
 </file>
 
 <file path=customXml/item2.xml><?xml version="1.0" encoding="utf-8"?>
-<p:properties xmlns:p="http://schemas.microsoft.com/office/2006/metadata/properties" xmlns:xsi="http://www.w3.org/2001/XMLSchema-instance" xmlns:pc="http://schemas.microsoft.com/office/infopath/2007/PartnerControls">
-  <documentManagement/>
-</p:properties>
-</file>
-
-<file path=customXml/item3.xml><?xml version="1.0" encoding="utf-8"?>
 <ct:contentTypeSchema xmlns:ct="http://schemas.microsoft.com/office/2006/metadata/contentType" xmlns:ma="http://schemas.microsoft.com/office/2006/metadata/properties/metaAttributes" ct:_="" ma:_="" ma:contentTypeName="Dokument" ma:contentTypeID="0x0101008D8A91355A09ED49A2CD37913ECCBD8F" ma:contentTypeVersion="10" ma:contentTypeDescription="Ein neues Dokument erstellen." ma:contentTypeScope="" ma:versionID="27876bd0c978c72af55f11f00f197b4d">
   <xsd:schema xmlns:xsd="http://www.w3.org/2001/XMLSchema" xmlns:xs="http://www.w3.org/2001/XMLSchema" xmlns:p="http://schemas.microsoft.com/office/2006/metadata/properties" xmlns:ns2="9c339813-10bc-447b-932a-1b9d7d5cf15f" targetNamespace="http://schemas.microsoft.com/office/2006/metadata/properties" ma:root="true" ma:fieldsID="f004244127d678be64938a86076237cc" ns2:_="">
     <xsd:import namespace="9c339813-10bc-447b-932a-1b9d7d5cf15f"/>
@@ -13767,6 +16029,12 @@
 </ct:contentTypeSchema>
 </file>
 
+<file path=customXml/item3.xml><?xml version="1.0" encoding="utf-8"?>
+<p:properties xmlns:p="http://schemas.microsoft.com/office/2006/metadata/properties" xmlns:xsi="http://www.w3.org/2001/XMLSchema-instance" xmlns:pc="http://schemas.microsoft.com/office/infopath/2007/PartnerControls">
+  <documentManagement/>
+</p:properties>
+</file>
+
 <file path=customXml/itemProps1.xml><?xml version="1.0" encoding="utf-8"?>
 <ds:datastoreItem xmlns:ds="http://schemas.openxmlformats.org/officeDocument/2006/customXml" ds:itemID="{BDCB3EC0-5DCA-48F2-BD01-54E02CFCF6AA}">
   <ds:schemaRefs>
@@ -13776,22 +16044,6 @@
 </file>
 
 <file path=customXml/itemProps2.xml><?xml version="1.0" encoding="utf-8"?>
-<ds:datastoreItem xmlns:ds="http://schemas.openxmlformats.org/officeDocument/2006/customXml" ds:itemID="{07CCB9E7-C57A-4E96-958B-42A4B20CD0B8}">
-  <ds:schemaRefs>
-    <ds:schemaRef ds:uri="http://purl.org/dc/dcmitype/"/>
-    <ds:schemaRef ds:uri="http://schemas.microsoft.com/office/infopath/2007/PartnerControls"/>
-    <ds:schemaRef ds:uri="9c339813-10bc-447b-932a-1b9d7d5cf15f"/>
-    <ds:schemaRef ds:uri="http://purl.org/dc/elements/1.1/"/>
-    <ds:schemaRef ds:uri="http://schemas.microsoft.com/office/2006/documentManagement/types"/>
-    <ds:schemaRef ds:uri="http://purl.org/dc/terms/"/>
-    <ds:schemaRef ds:uri="http://schemas.openxmlformats.org/package/2006/metadata/core-properties"/>
-    <ds:schemaRef ds:uri="http://schemas.microsoft.com/office/2006/metadata/properties"/>
-    <ds:schemaRef ds:uri="http://www.w3.org/XML/1998/namespace"/>
-  </ds:schemaRefs>
-</ds:datastoreItem>
-</file>
-
-<file path=customXml/itemProps3.xml><?xml version="1.0" encoding="utf-8"?>
 <ds:datastoreItem xmlns:ds="http://schemas.openxmlformats.org/officeDocument/2006/customXml" ds:itemID="{45A0E1BB-5BB6-4EAB-9A73-FD942EA25190}">
   <ds:schemaRefs>
     <ds:schemaRef ds:uri="http://schemas.microsoft.com/office/2006/metadata/contentType"/>
@@ -13807,4 +16059,20 @@
     <ds:schemaRef ds:uri="http://schemas.microsoft.com/internal/obd"/>
   </ds:schemaRefs>
 </ds:datastoreItem>
+</file>
+
+<file path=customXml/itemProps3.xml><?xml version="1.0" encoding="utf-8"?>
+<ds:datastoreItem xmlns:ds="http://schemas.openxmlformats.org/officeDocument/2006/customXml" ds:itemID="{07CCB9E7-C57A-4E96-958B-42A4B20CD0B8}">
+  <ds:schemaRefs>
+    <ds:schemaRef ds:uri="http://purl.org/dc/dcmitype/"/>
+    <ds:schemaRef ds:uri="http://schemas.microsoft.com/office/infopath/2007/PartnerControls"/>
+    <ds:schemaRef ds:uri="9c339813-10bc-447b-932a-1b9d7d5cf15f"/>
+    <ds:schemaRef ds:uri="http://purl.org/dc/elements/1.1/"/>
+    <ds:schemaRef ds:uri="http://schemas.microsoft.com/office/2006/documentManagement/types"/>
+    <ds:schemaRef ds:uri="http://purl.org/dc/terms/"/>
+    <ds:schemaRef ds:uri="http://schemas.openxmlformats.org/package/2006/metadata/core-properties"/>
+    <ds:schemaRef ds:uri="http://schemas.microsoft.com/office/2006/metadata/properties"/>
+    <ds:schemaRef ds:uri="http://www.w3.org/XML/1998/namespace"/>
+  </ds:schemaRefs>
+</ds:datastoreItem>
 </file>
</xml_diff>